<commit_message>
#433 more documentation material for landing page
</commit_message>
<xml_diff>
--- a/docs/documentation/tilda-logo.pptx
+++ b/docs/documentation/tilda-logo.pptx
@@ -6,6 +6,8 @@
   </p:sldMasterIdLst>
   <p:sldIdLst>
     <p:sldId id="256" r:id="rId2"/>
+    <p:sldId id="257" r:id="rId3"/>
+    <p:sldId id="258" r:id="rId4"/>
   </p:sldIdLst>
   <p:sldSz cx="12192000" cy="6858000"/>
   <p:notesSz cx="6858000" cy="9144000"/>
@@ -104,6 +106,11 @@
       </a:defRPr>
     </a:lvl9pPr>
   </p:defaultTextStyle>
+  <p:extLst>
+    <p:ext uri="{EFAFB233-063F-42B5-8137-9DF3F51BA10A}">
+      <p15:sldGuideLst xmlns:p15="http://schemas.microsoft.com/office/powerpoint/2012/main"/>
+    </p:ext>
+  </p:extLst>
 </p:presentation>
 </file>
 
@@ -254,7 +261,7 @@
           <a:p>
             <a:fld id="{05FCAEFC-16D1-4C35-BA79-11BB31B47BC3}" type="datetimeFigureOut">
               <a:rPr lang="en-US" smtClean="0"/>
-              <a:t>2017-12-03</a:t>
+              <a:t>2019-09-17</a:t>
             </a:fld>
             <a:endParaRPr lang="en-US"/>
           </a:p>
@@ -452,7 +459,7 @@
           <a:p>
             <a:fld id="{05FCAEFC-16D1-4C35-BA79-11BB31B47BC3}" type="datetimeFigureOut">
               <a:rPr lang="en-US" smtClean="0"/>
-              <a:t>2017-12-03</a:t>
+              <a:t>2019-09-17</a:t>
             </a:fld>
             <a:endParaRPr lang="en-US"/>
           </a:p>
@@ -660,7 +667,7 @@
           <a:p>
             <a:fld id="{05FCAEFC-16D1-4C35-BA79-11BB31B47BC3}" type="datetimeFigureOut">
               <a:rPr lang="en-US" smtClean="0"/>
-              <a:t>2017-12-03</a:t>
+              <a:t>2019-09-17</a:t>
             </a:fld>
             <a:endParaRPr lang="en-US"/>
           </a:p>
@@ -858,7 +865,7 @@
           <a:p>
             <a:fld id="{05FCAEFC-16D1-4C35-BA79-11BB31B47BC3}" type="datetimeFigureOut">
               <a:rPr lang="en-US" smtClean="0"/>
-              <a:t>2017-12-03</a:t>
+              <a:t>2019-09-17</a:t>
             </a:fld>
             <a:endParaRPr lang="en-US"/>
           </a:p>
@@ -1133,7 +1140,7 @@
           <a:p>
             <a:fld id="{05FCAEFC-16D1-4C35-BA79-11BB31B47BC3}" type="datetimeFigureOut">
               <a:rPr lang="en-US" smtClean="0"/>
-              <a:t>2017-12-03</a:t>
+              <a:t>2019-09-17</a:t>
             </a:fld>
             <a:endParaRPr lang="en-US"/>
           </a:p>
@@ -1398,7 +1405,7 @@
           <a:p>
             <a:fld id="{05FCAEFC-16D1-4C35-BA79-11BB31B47BC3}" type="datetimeFigureOut">
               <a:rPr lang="en-US" smtClean="0"/>
-              <a:t>2017-12-03</a:t>
+              <a:t>2019-09-17</a:t>
             </a:fld>
             <a:endParaRPr lang="en-US"/>
           </a:p>
@@ -1810,7 +1817,7 @@
           <a:p>
             <a:fld id="{05FCAEFC-16D1-4C35-BA79-11BB31B47BC3}" type="datetimeFigureOut">
               <a:rPr lang="en-US" smtClean="0"/>
-              <a:t>2017-12-03</a:t>
+              <a:t>2019-09-17</a:t>
             </a:fld>
             <a:endParaRPr lang="en-US"/>
           </a:p>
@@ -1951,7 +1958,7 @@
           <a:p>
             <a:fld id="{05FCAEFC-16D1-4C35-BA79-11BB31B47BC3}" type="datetimeFigureOut">
               <a:rPr lang="en-US" smtClean="0"/>
-              <a:t>2017-12-03</a:t>
+              <a:t>2019-09-17</a:t>
             </a:fld>
             <a:endParaRPr lang="en-US"/>
           </a:p>
@@ -2064,7 +2071,7 @@
           <a:p>
             <a:fld id="{05FCAEFC-16D1-4C35-BA79-11BB31B47BC3}" type="datetimeFigureOut">
               <a:rPr lang="en-US" smtClean="0"/>
-              <a:t>2017-12-03</a:t>
+              <a:t>2019-09-17</a:t>
             </a:fld>
             <a:endParaRPr lang="en-US"/>
           </a:p>
@@ -2375,7 +2382,7 @@
           <a:p>
             <a:fld id="{05FCAEFC-16D1-4C35-BA79-11BB31B47BC3}" type="datetimeFigureOut">
               <a:rPr lang="en-US" smtClean="0"/>
-              <a:t>2017-12-03</a:t>
+              <a:t>2019-09-17</a:t>
             </a:fld>
             <a:endParaRPr lang="en-US"/>
           </a:p>
@@ -2663,7 +2670,7 @@
           <a:p>
             <a:fld id="{05FCAEFC-16D1-4C35-BA79-11BB31B47BC3}" type="datetimeFigureOut">
               <a:rPr lang="en-US" smtClean="0"/>
-              <a:t>2017-12-03</a:t>
+              <a:t>2019-09-17</a:t>
             </a:fld>
             <a:endParaRPr lang="en-US"/>
           </a:p>
@@ -2904,7 +2911,7 @@
           <a:p>
             <a:fld id="{05FCAEFC-16D1-4C35-BA79-11BB31B47BC3}" type="datetimeFigureOut">
               <a:rPr lang="en-US" smtClean="0"/>
-              <a:t>2017-12-03</a:t>
+              <a:t>2019-09-17</a:t>
             </a:fld>
             <a:endParaRPr lang="en-US"/>
           </a:p>
@@ -3468,6 +3475,1505 @@
 </p:sld>
 </file>
 
+<file path=ppt/slides/slide2.xml><?xml version="1.0" encoding="utf-8"?>
+<p:sld xmlns:a="http://schemas.openxmlformats.org/drawingml/2006/main" xmlns:r="http://schemas.openxmlformats.org/officeDocument/2006/relationships" xmlns:p="http://schemas.openxmlformats.org/presentationml/2006/main">
+  <p:cSld>
+    <p:spTree>
+      <p:nvGrpSpPr>
+        <p:cNvPr id="1" name=""/>
+        <p:cNvGrpSpPr/>
+        <p:nvPr/>
+      </p:nvGrpSpPr>
+      <p:grpSpPr>
+        <a:xfrm>
+          <a:off x="0" y="0"/>
+          <a:ext cx="0" cy="0"/>
+          <a:chOff x="0" y="0"/>
+          <a:chExt cx="0" cy="0"/>
+        </a:xfrm>
+      </p:grpSpPr>
+      <p:sp>
+        <p:nvSpPr>
+          <p:cNvPr id="4" name="TextBox 3">
+            <a:extLst>
+              <a:ext uri="{FF2B5EF4-FFF2-40B4-BE49-F238E27FC236}">
+                <a16:creationId xmlns:a16="http://schemas.microsoft.com/office/drawing/2014/main" id="{03B02F88-A0A5-4D93-A5B9-20E8B484821E}"/>
+              </a:ext>
+            </a:extLst>
+          </p:cNvPr>
+          <p:cNvSpPr txBox="1"/>
+          <p:nvPr/>
+        </p:nvSpPr>
+        <p:spPr>
+          <a:xfrm>
+            <a:off x="348342" y="191588"/>
+            <a:ext cx="2528256" cy="1200329"/>
+          </a:xfrm>
+          <a:prstGeom prst="rect">
+            <a:avLst/>
+          </a:prstGeom>
+          <a:noFill/>
+        </p:spPr>
+        <p:txBody>
+          <a:bodyPr wrap="none" rtlCol="0">
+            <a:spAutoFit/>
+          </a:bodyPr>
+          <a:lstStyle/>
+          <a:p>
+            <a:r>
+              <a:rPr lang="en-US" sz="7200" dirty="0">
+                <a:latin typeface="Urania Czech" panose="02000000000000000000" pitchFamily="2" charset="0"/>
+              </a:rPr>
+              <a:t>Tilda</a:t>
+            </a:r>
+          </a:p>
+        </p:txBody>
+      </p:sp>
+      <p:pic>
+        <p:nvPicPr>
+          <p:cNvPr id="5" name="Picture 4">
+            <a:extLst>
+              <a:ext uri="{FF2B5EF4-FFF2-40B4-BE49-F238E27FC236}">
+                <a16:creationId xmlns:a16="http://schemas.microsoft.com/office/drawing/2014/main" id="{8A656E98-CB15-4128-B274-B1A36DAB761C}"/>
+              </a:ext>
+            </a:extLst>
+          </p:cNvPr>
+          <p:cNvPicPr>
+            <a:picLocks noChangeAspect="1"/>
+          </p:cNvPicPr>
+          <p:nvPr/>
+        </p:nvPicPr>
+        <p:blipFill>
+          <a:blip r:embed="rId2"/>
+          <a:stretch>
+            <a:fillRect/>
+          </a:stretch>
+        </p:blipFill>
+        <p:spPr>
+          <a:xfrm>
+            <a:off x="10171503" y="1268972"/>
+            <a:ext cx="1532725" cy="1095827"/>
+          </a:xfrm>
+          <a:prstGeom prst="rect">
+            <a:avLst/>
+          </a:prstGeom>
+        </p:spPr>
+      </p:pic>
+      <p:sp>
+        <p:nvSpPr>
+          <p:cNvPr id="6" name="TextBox 5">
+            <a:extLst>
+              <a:ext uri="{FF2B5EF4-FFF2-40B4-BE49-F238E27FC236}">
+                <a16:creationId xmlns:a16="http://schemas.microsoft.com/office/drawing/2014/main" id="{09A00E41-05A0-47D7-B05F-8D63726EF5A4}"/>
+              </a:ext>
+            </a:extLst>
+          </p:cNvPr>
+          <p:cNvSpPr txBox="1"/>
+          <p:nvPr/>
+        </p:nvSpPr>
+        <p:spPr>
+          <a:xfrm>
+            <a:off x="348342" y="1268973"/>
+            <a:ext cx="1780103" cy="1200329"/>
+          </a:xfrm>
+          <a:prstGeom prst="rect">
+            <a:avLst/>
+          </a:prstGeom>
+          <a:noFill/>
+        </p:spPr>
+        <p:txBody>
+          <a:bodyPr wrap="none" rtlCol="0">
+            <a:spAutoFit/>
+          </a:bodyPr>
+          <a:lstStyle/>
+          <a:p>
+            <a:r>
+              <a:rPr lang="en-US" sz="7200" dirty="0">
+                <a:latin typeface="Peignot" panose="00000400000000000000" pitchFamily="2" charset="0"/>
+              </a:rPr>
+              <a:t>Tilda</a:t>
+            </a:r>
+          </a:p>
+        </p:txBody>
+      </p:sp>
+      <p:sp>
+        <p:nvSpPr>
+          <p:cNvPr id="7" name="TextBox 6">
+            <a:extLst>
+              <a:ext uri="{FF2B5EF4-FFF2-40B4-BE49-F238E27FC236}">
+                <a16:creationId xmlns:a16="http://schemas.microsoft.com/office/drawing/2014/main" id="{EDE5B833-B42E-4C2B-B062-541ED1F4E260}"/>
+              </a:ext>
+            </a:extLst>
+          </p:cNvPr>
+          <p:cNvSpPr txBox="1"/>
+          <p:nvPr/>
+        </p:nvSpPr>
+        <p:spPr>
+          <a:xfrm>
+            <a:off x="348341" y="2228671"/>
+            <a:ext cx="1247457" cy="1200329"/>
+          </a:xfrm>
+          <a:prstGeom prst="rect">
+            <a:avLst/>
+          </a:prstGeom>
+          <a:noFill/>
+        </p:spPr>
+        <p:txBody>
+          <a:bodyPr wrap="none" rtlCol="0">
+            <a:spAutoFit/>
+          </a:bodyPr>
+          <a:lstStyle/>
+          <a:p>
+            <a:r>
+              <a:rPr lang="en-US" sz="7200" b="1" spc="300" dirty="0">
+                <a:latin typeface="Modern Typography NF" panose="02010508080704020104" pitchFamily="2" charset="0"/>
+              </a:rPr>
+              <a:t>Tilda</a:t>
+            </a:r>
+          </a:p>
+        </p:txBody>
+      </p:sp>
+      <p:sp>
+        <p:nvSpPr>
+          <p:cNvPr id="8" name="TextBox 7">
+            <a:extLst>
+              <a:ext uri="{FF2B5EF4-FFF2-40B4-BE49-F238E27FC236}">
+                <a16:creationId xmlns:a16="http://schemas.microsoft.com/office/drawing/2014/main" id="{6E1E5EB0-855A-4625-988C-C64D826286E4}"/>
+              </a:ext>
+            </a:extLst>
+          </p:cNvPr>
+          <p:cNvSpPr txBox="1"/>
+          <p:nvPr/>
+        </p:nvSpPr>
+        <p:spPr>
+          <a:xfrm>
+            <a:off x="348340" y="3306056"/>
+            <a:ext cx="1838965" cy="1200329"/>
+          </a:xfrm>
+          <a:prstGeom prst="rect">
+            <a:avLst/>
+          </a:prstGeom>
+          <a:noFill/>
+        </p:spPr>
+        <p:txBody>
+          <a:bodyPr wrap="none" rtlCol="0">
+            <a:spAutoFit/>
+          </a:bodyPr>
+          <a:lstStyle/>
+          <a:p>
+            <a:r>
+              <a:rPr lang="en-US" sz="7200" dirty="0">
+                <a:latin typeface="Ming" panose="00000400000000000000" pitchFamily="2" charset="0"/>
+              </a:rPr>
+              <a:t>Tilda</a:t>
+            </a:r>
+          </a:p>
+        </p:txBody>
+      </p:sp>
+      <p:sp>
+        <p:nvSpPr>
+          <p:cNvPr id="9" name="TextBox 8">
+            <a:extLst>
+              <a:ext uri="{FF2B5EF4-FFF2-40B4-BE49-F238E27FC236}">
+                <a16:creationId xmlns:a16="http://schemas.microsoft.com/office/drawing/2014/main" id="{FCCD7C7E-6F98-472D-8077-23489176A989}"/>
+              </a:ext>
+            </a:extLst>
+          </p:cNvPr>
+          <p:cNvSpPr txBox="1"/>
+          <p:nvPr/>
+        </p:nvSpPr>
+        <p:spPr>
+          <a:xfrm>
+            <a:off x="348340" y="4235704"/>
+            <a:ext cx="1604927" cy="1200329"/>
+          </a:xfrm>
+          <a:prstGeom prst="rect">
+            <a:avLst/>
+          </a:prstGeom>
+          <a:noFill/>
+        </p:spPr>
+        <p:txBody>
+          <a:bodyPr wrap="none" rtlCol="0">
+            <a:spAutoFit/>
+          </a:bodyPr>
+          <a:lstStyle/>
+          <a:p>
+            <a:r>
+              <a:rPr lang="en-US" sz="7200" dirty="0">
+                <a:latin typeface="Grenadier NF" panose="02010503020304020304" pitchFamily="2" charset="0"/>
+              </a:rPr>
+              <a:t>Tilda</a:t>
+            </a:r>
+          </a:p>
+        </p:txBody>
+      </p:sp>
+      <p:sp>
+        <p:nvSpPr>
+          <p:cNvPr id="10" name="TextBox 9">
+            <a:extLst>
+              <a:ext uri="{FF2B5EF4-FFF2-40B4-BE49-F238E27FC236}">
+                <a16:creationId xmlns:a16="http://schemas.microsoft.com/office/drawing/2014/main" id="{6BDF3EC6-2F91-437B-AEA2-DEC4BBEB4BD8}"/>
+              </a:ext>
+            </a:extLst>
+          </p:cNvPr>
+          <p:cNvSpPr txBox="1"/>
+          <p:nvPr/>
+        </p:nvSpPr>
+        <p:spPr>
+          <a:xfrm>
+            <a:off x="348340" y="5111792"/>
+            <a:ext cx="1604927" cy="1200329"/>
+          </a:xfrm>
+          <a:prstGeom prst="rect">
+            <a:avLst/>
+          </a:prstGeom>
+          <a:noFill/>
+        </p:spPr>
+        <p:txBody>
+          <a:bodyPr wrap="none" rtlCol="0">
+            <a:spAutoFit/>
+          </a:bodyPr>
+          <a:lstStyle/>
+          <a:p>
+            <a:r>
+              <a:rPr lang="en-US" sz="7200" dirty="0">
+                <a:latin typeface="Facets NF" panose="02010606020704020104" pitchFamily="2" charset="0"/>
+              </a:rPr>
+              <a:t>Tilda</a:t>
+            </a:r>
+          </a:p>
+        </p:txBody>
+      </p:sp>
+      <p:sp>
+        <p:nvSpPr>
+          <p:cNvPr id="11" name="TextBox 10">
+            <a:extLst>
+              <a:ext uri="{FF2B5EF4-FFF2-40B4-BE49-F238E27FC236}">
+                <a16:creationId xmlns:a16="http://schemas.microsoft.com/office/drawing/2014/main" id="{89FD135C-3FAD-4249-B415-D829B8F01511}"/>
+              </a:ext>
+            </a:extLst>
+          </p:cNvPr>
+          <p:cNvSpPr txBox="1"/>
+          <p:nvPr/>
+        </p:nvSpPr>
+        <p:spPr>
+          <a:xfrm>
+            <a:off x="2913638" y="300306"/>
+            <a:ext cx="1290738" cy="1200329"/>
+          </a:xfrm>
+          <a:prstGeom prst="rect">
+            <a:avLst/>
+          </a:prstGeom>
+          <a:noFill/>
+        </p:spPr>
+        <p:txBody>
+          <a:bodyPr wrap="none" rtlCol="0">
+            <a:spAutoFit/>
+          </a:bodyPr>
+          <a:lstStyle/>
+          <a:p>
+            <a:r>
+              <a:rPr lang="en-US" sz="7200" dirty="0">
+                <a:latin typeface="Bittersweet NF" panose="02080508020303020104" pitchFamily="18" charset="0"/>
+              </a:rPr>
+              <a:t>Tilda</a:t>
+            </a:r>
+          </a:p>
+        </p:txBody>
+      </p:sp>
+      <p:sp>
+        <p:nvSpPr>
+          <p:cNvPr id="12" name="TextBox 11">
+            <a:extLst>
+              <a:ext uri="{FF2B5EF4-FFF2-40B4-BE49-F238E27FC236}">
+                <a16:creationId xmlns:a16="http://schemas.microsoft.com/office/drawing/2014/main" id="{48ECE9B0-0977-45A5-8E07-0E366D0C609F}"/>
+              </a:ext>
+            </a:extLst>
+          </p:cNvPr>
+          <p:cNvSpPr txBox="1"/>
+          <p:nvPr/>
+        </p:nvSpPr>
+        <p:spPr>
+          <a:xfrm>
+            <a:off x="2869717" y="1268972"/>
+            <a:ext cx="1484574" cy="1200329"/>
+          </a:xfrm>
+          <a:prstGeom prst="rect">
+            <a:avLst/>
+          </a:prstGeom>
+          <a:noFill/>
+        </p:spPr>
+        <p:txBody>
+          <a:bodyPr wrap="none" rtlCol="0">
+            <a:spAutoFit/>
+          </a:bodyPr>
+          <a:lstStyle/>
+          <a:p>
+            <a:r>
+              <a:rPr lang="en-US" sz="7200" dirty="0">
+                <a:latin typeface="BeautySchoolDropout" pitchFamily="2" charset="0"/>
+              </a:rPr>
+              <a:t>Tilda</a:t>
+            </a:r>
+          </a:p>
+        </p:txBody>
+      </p:sp>
+      <p:sp>
+        <p:nvSpPr>
+          <p:cNvPr id="13" name="TextBox 12">
+            <a:extLst>
+              <a:ext uri="{FF2B5EF4-FFF2-40B4-BE49-F238E27FC236}">
+                <a16:creationId xmlns:a16="http://schemas.microsoft.com/office/drawing/2014/main" id="{BFA261B3-1BC4-473B-B256-69AE824AA8DE}"/>
+              </a:ext>
+            </a:extLst>
+          </p:cNvPr>
+          <p:cNvSpPr txBox="1"/>
+          <p:nvPr/>
+        </p:nvSpPr>
+        <p:spPr>
+          <a:xfrm>
+            <a:off x="2897463" y="2270827"/>
+            <a:ext cx="1689886" cy="1200329"/>
+          </a:xfrm>
+          <a:prstGeom prst="rect">
+            <a:avLst/>
+          </a:prstGeom>
+          <a:noFill/>
+        </p:spPr>
+        <p:txBody>
+          <a:bodyPr wrap="none" rtlCol="0">
+            <a:spAutoFit/>
+          </a:bodyPr>
+          <a:lstStyle/>
+          <a:p>
+            <a:r>
+              <a:rPr lang="en-US" sz="7200" dirty="0">
+                <a:latin typeface="BeautySchoolDropoutII" pitchFamily="2" charset="0"/>
+              </a:rPr>
+              <a:t>Tilda</a:t>
+            </a:r>
+          </a:p>
+        </p:txBody>
+      </p:sp>
+      <p:sp>
+        <p:nvSpPr>
+          <p:cNvPr id="14" name="TextBox 13">
+            <a:extLst>
+              <a:ext uri="{FF2B5EF4-FFF2-40B4-BE49-F238E27FC236}">
+                <a16:creationId xmlns:a16="http://schemas.microsoft.com/office/drawing/2014/main" id="{512DC951-84FC-4567-AD62-A0556DF32320}"/>
+              </a:ext>
+            </a:extLst>
+          </p:cNvPr>
+          <p:cNvSpPr txBox="1"/>
+          <p:nvPr/>
+        </p:nvSpPr>
+        <p:spPr>
+          <a:xfrm>
+            <a:off x="2971346" y="3261690"/>
+            <a:ext cx="1258678" cy="1200329"/>
+          </a:xfrm>
+          <a:prstGeom prst="rect">
+            <a:avLst/>
+          </a:prstGeom>
+          <a:noFill/>
+        </p:spPr>
+        <p:txBody>
+          <a:bodyPr wrap="none" rtlCol="0">
+            <a:spAutoFit/>
+          </a:bodyPr>
+          <a:lstStyle/>
+          <a:p>
+            <a:r>
+              <a:rPr lang="en-US" sz="7200" dirty="0">
+                <a:latin typeface="Astrud" panose="00000400000000000000" pitchFamily="2" charset="0"/>
+              </a:rPr>
+              <a:t>Tilda</a:t>
+            </a:r>
+          </a:p>
+        </p:txBody>
+      </p:sp>
+      <p:sp>
+        <p:nvSpPr>
+          <p:cNvPr id="15" name="TextBox 14">
+            <a:extLst>
+              <a:ext uri="{FF2B5EF4-FFF2-40B4-BE49-F238E27FC236}">
+                <a16:creationId xmlns:a16="http://schemas.microsoft.com/office/drawing/2014/main" id="{53E1384F-59B3-4BBD-A404-F1D2878F5E6A}"/>
+              </a:ext>
+            </a:extLst>
+          </p:cNvPr>
+          <p:cNvSpPr txBox="1"/>
+          <p:nvPr/>
+        </p:nvSpPr>
+        <p:spPr>
+          <a:xfrm>
+            <a:off x="2971346" y="4235703"/>
+            <a:ext cx="1309974" cy="1200329"/>
+          </a:xfrm>
+          <a:prstGeom prst="rect">
+            <a:avLst/>
+          </a:prstGeom>
+          <a:noFill/>
+        </p:spPr>
+        <p:txBody>
+          <a:bodyPr wrap="none" rtlCol="0">
+            <a:spAutoFit/>
+          </a:bodyPr>
+          <a:lstStyle/>
+          <a:p>
+            <a:r>
+              <a:rPr lang="en-US" sz="7200" dirty="0">
+                <a:latin typeface="Articulate" pitchFamily="2" charset="0"/>
+              </a:rPr>
+              <a:t>Tilda</a:t>
+            </a:r>
+          </a:p>
+        </p:txBody>
+      </p:sp>
+      <p:sp>
+        <p:nvSpPr>
+          <p:cNvPr id="16" name="TextBox 15">
+            <a:extLst>
+              <a:ext uri="{FF2B5EF4-FFF2-40B4-BE49-F238E27FC236}">
+                <a16:creationId xmlns:a16="http://schemas.microsoft.com/office/drawing/2014/main" id="{05395389-4F3F-408B-A198-94D27B3357F3}"/>
+              </a:ext>
+            </a:extLst>
+          </p:cNvPr>
+          <p:cNvSpPr txBox="1"/>
+          <p:nvPr/>
+        </p:nvSpPr>
+        <p:spPr>
+          <a:xfrm>
+            <a:off x="2971346" y="5223788"/>
+            <a:ext cx="1519968" cy="1200329"/>
+          </a:xfrm>
+          <a:prstGeom prst="rect">
+            <a:avLst/>
+          </a:prstGeom>
+          <a:noFill/>
+        </p:spPr>
+        <p:txBody>
+          <a:bodyPr wrap="none" rtlCol="0">
+            <a:spAutoFit/>
+          </a:bodyPr>
+          <a:lstStyle/>
+          <a:p>
+            <a:r>
+              <a:rPr lang="en-US" sz="7200" b="1" dirty="0">
+                <a:latin typeface="Breamcatcher" panose="04090904080B02020A04" pitchFamily="82" charset="0"/>
+              </a:rPr>
+              <a:t>Tilda</a:t>
+            </a:r>
+          </a:p>
+        </p:txBody>
+      </p:sp>
+      <p:sp>
+        <p:nvSpPr>
+          <p:cNvPr id="17" name="TextBox 16">
+            <a:extLst>
+              <a:ext uri="{FF2B5EF4-FFF2-40B4-BE49-F238E27FC236}">
+                <a16:creationId xmlns:a16="http://schemas.microsoft.com/office/drawing/2014/main" id="{773AB5E2-CB97-48AC-ACA8-2495BD490C01}"/>
+              </a:ext>
+            </a:extLst>
+          </p:cNvPr>
+          <p:cNvSpPr txBox="1"/>
+          <p:nvPr/>
+        </p:nvSpPr>
+        <p:spPr>
+          <a:xfrm>
+            <a:off x="9857248" y="2661525"/>
+            <a:ext cx="1846980" cy="1200329"/>
+          </a:xfrm>
+          <a:prstGeom prst="rect">
+            <a:avLst/>
+          </a:prstGeom>
+          <a:noFill/>
+        </p:spPr>
+        <p:txBody>
+          <a:bodyPr wrap="none" rtlCol="0">
+            <a:spAutoFit/>
+          </a:bodyPr>
+          <a:lstStyle/>
+          <a:p>
+            <a:r>
+              <a:rPr lang="en-US" sz="7200" dirty="0">
+                <a:latin typeface="Calamity Jane NF" panose="02040303020201020402" pitchFamily="18" charset="0"/>
+              </a:rPr>
+              <a:t>Tilda</a:t>
+            </a:r>
+          </a:p>
+        </p:txBody>
+      </p:sp>
+      <p:sp>
+        <p:nvSpPr>
+          <p:cNvPr id="18" name="TextBox 17">
+            <a:extLst>
+              <a:ext uri="{FF2B5EF4-FFF2-40B4-BE49-F238E27FC236}">
+                <a16:creationId xmlns:a16="http://schemas.microsoft.com/office/drawing/2014/main" id="{6041A31B-4B5F-4A88-B49F-275DB52B840E}"/>
+              </a:ext>
+            </a:extLst>
+          </p:cNvPr>
+          <p:cNvSpPr txBox="1"/>
+          <p:nvPr/>
+        </p:nvSpPr>
+        <p:spPr>
+          <a:xfrm>
+            <a:off x="5251118" y="191588"/>
+            <a:ext cx="2715808" cy="1200329"/>
+          </a:xfrm>
+          <a:prstGeom prst="rect">
+            <a:avLst/>
+          </a:prstGeom>
+          <a:noFill/>
+        </p:spPr>
+        <p:txBody>
+          <a:bodyPr wrap="none" rtlCol="0">
+            <a:spAutoFit/>
+          </a:bodyPr>
+          <a:lstStyle/>
+          <a:p>
+            <a:r>
+              <a:rPr lang="en-US" sz="7200" dirty="0">
+                <a:latin typeface="Urania Czech" panose="02000000000000000000" pitchFamily="2" charset="0"/>
+              </a:rPr>
+              <a:t>TILDA</a:t>
+            </a:r>
+          </a:p>
+        </p:txBody>
+      </p:sp>
+      <p:sp>
+        <p:nvSpPr>
+          <p:cNvPr id="19" name="TextBox 18">
+            <a:extLst>
+              <a:ext uri="{FF2B5EF4-FFF2-40B4-BE49-F238E27FC236}">
+                <a16:creationId xmlns:a16="http://schemas.microsoft.com/office/drawing/2014/main" id="{FD037322-EDE7-4DFB-B477-44F26CDD761B}"/>
+              </a:ext>
+            </a:extLst>
+          </p:cNvPr>
+          <p:cNvSpPr txBox="1"/>
+          <p:nvPr/>
+        </p:nvSpPr>
+        <p:spPr>
+          <a:xfrm>
+            <a:off x="5251118" y="1268973"/>
+            <a:ext cx="2531462" cy="1200329"/>
+          </a:xfrm>
+          <a:prstGeom prst="rect">
+            <a:avLst/>
+          </a:prstGeom>
+          <a:noFill/>
+        </p:spPr>
+        <p:txBody>
+          <a:bodyPr wrap="none" rtlCol="0">
+            <a:spAutoFit/>
+          </a:bodyPr>
+          <a:lstStyle/>
+          <a:p>
+            <a:r>
+              <a:rPr lang="en-US" sz="7200" dirty="0">
+                <a:latin typeface="Peignot" panose="00000400000000000000" pitchFamily="2" charset="0"/>
+              </a:rPr>
+              <a:t>TILDA</a:t>
+            </a:r>
+          </a:p>
+        </p:txBody>
+      </p:sp>
+      <p:sp>
+        <p:nvSpPr>
+          <p:cNvPr id="20" name="TextBox 19">
+            <a:extLst>
+              <a:ext uri="{FF2B5EF4-FFF2-40B4-BE49-F238E27FC236}">
+                <a16:creationId xmlns:a16="http://schemas.microsoft.com/office/drawing/2014/main" id="{1F5025F6-698A-4DFB-BAB7-6B8933B88D20}"/>
+              </a:ext>
+            </a:extLst>
+          </p:cNvPr>
+          <p:cNvSpPr txBox="1"/>
+          <p:nvPr/>
+        </p:nvSpPr>
+        <p:spPr>
+          <a:xfrm>
+            <a:off x="5251117" y="2228671"/>
+            <a:ext cx="1247457" cy="1200329"/>
+          </a:xfrm>
+          <a:prstGeom prst="rect">
+            <a:avLst/>
+          </a:prstGeom>
+          <a:noFill/>
+        </p:spPr>
+        <p:txBody>
+          <a:bodyPr wrap="none" rtlCol="0">
+            <a:spAutoFit/>
+          </a:bodyPr>
+          <a:lstStyle/>
+          <a:p>
+            <a:r>
+              <a:rPr lang="en-US" sz="7200" b="1" spc="300" dirty="0">
+                <a:latin typeface="Modern Typography NF" panose="02010508080704020104" pitchFamily="2" charset="0"/>
+              </a:rPr>
+              <a:t>TILDA</a:t>
+            </a:r>
+          </a:p>
+        </p:txBody>
+      </p:sp>
+      <p:sp>
+        <p:nvSpPr>
+          <p:cNvPr id="21" name="TextBox 20">
+            <a:extLst>
+              <a:ext uri="{FF2B5EF4-FFF2-40B4-BE49-F238E27FC236}">
+                <a16:creationId xmlns:a16="http://schemas.microsoft.com/office/drawing/2014/main" id="{D815E9EA-65F0-426C-9745-F65A4295189A}"/>
+              </a:ext>
+            </a:extLst>
+          </p:cNvPr>
+          <p:cNvSpPr txBox="1"/>
+          <p:nvPr/>
+        </p:nvSpPr>
+        <p:spPr>
+          <a:xfrm>
+            <a:off x="5251116" y="3306056"/>
+            <a:ext cx="2291718" cy="1200329"/>
+          </a:xfrm>
+          <a:prstGeom prst="rect">
+            <a:avLst/>
+          </a:prstGeom>
+          <a:noFill/>
+        </p:spPr>
+        <p:txBody>
+          <a:bodyPr wrap="none" rtlCol="0">
+            <a:spAutoFit/>
+          </a:bodyPr>
+          <a:lstStyle/>
+          <a:p>
+            <a:r>
+              <a:rPr lang="en-US" sz="7200" dirty="0">
+                <a:latin typeface="Ming" panose="00000400000000000000" pitchFamily="2" charset="0"/>
+              </a:rPr>
+              <a:t>TILDA</a:t>
+            </a:r>
+          </a:p>
+        </p:txBody>
+      </p:sp>
+      <p:sp>
+        <p:nvSpPr>
+          <p:cNvPr id="22" name="TextBox 21">
+            <a:extLst>
+              <a:ext uri="{FF2B5EF4-FFF2-40B4-BE49-F238E27FC236}">
+                <a16:creationId xmlns:a16="http://schemas.microsoft.com/office/drawing/2014/main" id="{821C6B05-EB7F-420F-BE0C-4561D11DA8F8}"/>
+              </a:ext>
+            </a:extLst>
+          </p:cNvPr>
+          <p:cNvSpPr txBox="1"/>
+          <p:nvPr/>
+        </p:nvSpPr>
+        <p:spPr>
+          <a:xfrm>
+            <a:off x="5251116" y="4235704"/>
+            <a:ext cx="1754006" cy="1200329"/>
+          </a:xfrm>
+          <a:prstGeom prst="rect">
+            <a:avLst/>
+          </a:prstGeom>
+          <a:noFill/>
+        </p:spPr>
+        <p:txBody>
+          <a:bodyPr wrap="none" rtlCol="0">
+            <a:spAutoFit/>
+          </a:bodyPr>
+          <a:lstStyle/>
+          <a:p>
+            <a:r>
+              <a:rPr lang="en-US" sz="7200" dirty="0">
+                <a:latin typeface="Grenadier NF" panose="02010503020304020304" pitchFamily="2" charset="0"/>
+              </a:rPr>
+              <a:t>TILDA</a:t>
+            </a:r>
+          </a:p>
+        </p:txBody>
+      </p:sp>
+      <p:sp>
+        <p:nvSpPr>
+          <p:cNvPr id="23" name="TextBox 22">
+            <a:extLst>
+              <a:ext uri="{FF2B5EF4-FFF2-40B4-BE49-F238E27FC236}">
+                <a16:creationId xmlns:a16="http://schemas.microsoft.com/office/drawing/2014/main" id="{5F979154-A587-4837-ACFC-BEBAE5C1771E}"/>
+              </a:ext>
+            </a:extLst>
+          </p:cNvPr>
+          <p:cNvSpPr txBox="1"/>
+          <p:nvPr/>
+        </p:nvSpPr>
+        <p:spPr>
+          <a:xfrm>
+            <a:off x="5251116" y="5111792"/>
+            <a:ext cx="1604927" cy="1200329"/>
+          </a:xfrm>
+          <a:prstGeom prst="rect">
+            <a:avLst/>
+          </a:prstGeom>
+          <a:noFill/>
+        </p:spPr>
+        <p:txBody>
+          <a:bodyPr wrap="none" rtlCol="0">
+            <a:spAutoFit/>
+          </a:bodyPr>
+          <a:lstStyle/>
+          <a:p>
+            <a:r>
+              <a:rPr lang="en-US" sz="7200" dirty="0">
+                <a:latin typeface="Facets NF" panose="02010606020704020104" pitchFamily="2" charset="0"/>
+              </a:rPr>
+              <a:t>TILDA</a:t>
+            </a:r>
+          </a:p>
+        </p:txBody>
+      </p:sp>
+      <p:sp>
+        <p:nvSpPr>
+          <p:cNvPr id="24" name="TextBox 23">
+            <a:extLst>
+              <a:ext uri="{FF2B5EF4-FFF2-40B4-BE49-F238E27FC236}">
+                <a16:creationId xmlns:a16="http://schemas.microsoft.com/office/drawing/2014/main" id="{F813473D-2FAA-4266-BF17-B2423AEA32AD}"/>
+              </a:ext>
+            </a:extLst>
+          </p:cNvPr>
+          <p:cNvSpPr txBox="1"/>
+          <p:nvPr/>
+        </p:nvSpPr>
+        <p:spPr>
+          <a:xfrm>
+            <a:off x="7816414" y="300306"/>
+            <a:ext cx="1425390" cy="1200329"/>
+          </a:xfrm>
+          <a:prstGeom prst="rect">
+            <a:avLst/>
+          </a:prstGeom>
+          <a:noFill/>
+        </p:spPr>
+        <p:txBody>
+          <a:bodyPr wrap="none" rtlCol="0">
+            <a:spAutoFit/>
+          </a:bodyPr>
+          <a:lstStyle/>
+          <a:p>
+            <a:r>
+              <a:rPr lang="en-US" sz="7200" dirty="0">
+                <a:latin typeface="Bittersweet NF" panose="02080508020303020104" pitchFamily="18" charset="0"/>
+              </a:rPr>
+              <a:t>TILDA</a:t>
+            </a:r>
+          </a:p>
+        </p:txBody>
+      </p:sp>
+      <p:sp>
+        <p:nvSpPr>
+          <p:cNvPr id="25" name="TextBox 24">
+            <a:extLst>
+              <a:ext uri="{FF2B5EF4-FFF2-40B4-BE49-F238E27FC236}">
+                <a16:creationId xmlns:a16="http://schemas.microsoft.com/office/drawing/2014/main" id="{9E31893F-78E9-4489-ABA5-BC506E548A1D}"/>
+              </a:ext>
+            </a:extLst>
+          </p:cNvPr>
+          <p:cNvSpPr txBox="1"/>
+          <p:nvPr/>
+        </p:nvSpPr>
+        <p:spPr>
+          <a:xfrm>
+            <a:off x="7772493" y="1268972"/>
+            <a:ext cx="1628972" cy="1200329"/>
+          </a:xfrm>
+          <a:prstGeom prst="rect">
+            <a:avLst/>
+          </a:prstGeom>
+          <a:noFill/>
+        </p:spPr>
+        <p:txBody>
+          <a:bodyPr wrap="none" rtlCol="0">
+            <a:spAutoFit/>
+          </a:bodyPr>
+          <a:lstStyle/>
+          <a:p>
+            <a:r>
+              <a:rPr lang="en-US" sz="7200" dirty="0">
+                <a:latin typeface="BeautySchoolDropout" pitchFamily="2" charset="0"/>
+              </a:rPr>
+              <a:t>TILDA</a:t>
+            </a:r>
+          </a:p>
+        </p:txBody>
+      </p:sp>
+      <p:sp>
+        <p:nvSpPr>
+          <p:cNvPr id="26" name="TextBox 25">
+            <a:extLst>
+              <a:ext uri="{FF2B5EF4-FFF2-40B4-BE49-F238E27FC236}">
+                <a16:creationId xmlns:a16="http://schemas.microsoft.com/office/drawing/2014/main" id="{DD94179F-E389-4E9D-A69B-D965005C7E22}"/>
+              </a:ext>
+            </a:extLst>
+          </p:cNvPr>
+          <p:cNvSpPr txBox="1"/>
+          <p:nvPr/>
+        </p:nvSpPr>
+        <p:spPr>
+          <a:xfrm>
+            <a:off x="7800239" y="2270827"/>
+            <a:ext cx="1843774" cy="1200329"/>
+          </a:xfrm>
+          <a:prstGeom prst="rect">
+            <a:avLst/>
+          </a:prstGeom>
+          <a:noFill/>
+        </p:spPr>
+        <p:txBody>
+          <a:bodyPr wrap="none" rtlCol="0">
+            <a:spAutoFit/>
+          </a:bodyPr>
+          <a:lstStyle/>
+          <a:p>
+            <a:r>
+              <a:rPr lang="en-US" sz="7200" dirty="0">
+                <a:latin typeface="BeautySchoolDropoutII" pitchFamily="2" charset="0"/>
+              </a:rPr>
+              <a:t>TILDA</a:t>
+            </a:r>
+          </a:p>
+        </p:txBody>
+      </p:sp>
+      <p:sp>
+        <p:nvSpPr>
+          <p:cNvPr id="27" name="TextBox 26">
+            <a:extLst>
+              <a:ext uri="{FF2B5EF4-FFF2-40B4-BE49-F238E27FC236}">
+                <a16:creationId xmlns:a16="http://schemas.microsoft.com/office/drawing/2014/main" id="{E610DBBE-FCF1-411A-A68F-0AF2FE18AF7E}"/>
+              </a:ext>
+            </a:extLst>
+          </p:cNvPr>
+          <p:cNvSpPr txBox="1"/>
+          <p:nvPr/>
+        </p:nvSpPr>
+        <p:spPr>
+          <a:xfrm>
+            <a:off x="7874122" y="3261690"/>
+            <a:ext cx="1375698" cy="1200329"/>
+          </a:xfrm>
+          <a:prstGeom prst="rect">
+            <a:avLst/>
+          </a:prstGeom>
+          <a:noFill/>
+        </p:spPr>
+        <p:txBody>
+          <a:bodyPr wrap="none" rtlCol="0">
+            <a:spAutoFit/>
+          </a:bodyPr>
+          <a:lstStyle/>
+          <a:p>
+            <a:r>
+              <a:rPr lang="en-US" sz="7200" dirty="0">
+                <a:latin typeface="Astrud" panose="00000400000000000000" pitchFamily="2" charset="0"/>
+              </a:rPr>
+              <a:t>TILDA</a:t>
+            </a:r>
+          </a:p>
+        </p:txBody>
+      </p:sp>
+      <p:sp>
+        <p:nvSpPr>
+          <p:cNvPr id="28" name="TextBox 27">
+            <a:extLst>
+              <a:ext uri="{FF2B5EF4-FFF2-40B4-BE49-F238E27FC236}">
+                <a16:creationId xmlns:a16="http://schemas.microsoft.com/office/drawing/2014/main" id="{41663378-3DA4-464B-B44B-6BB57A064908}"/>
+              </a:ext>
+            </a:extLst>
+          </p:cNvPr>
+          <p:cNvSpPr txBox="1"/>
+          <p:nvPr/>
+        </p:nvSpPr>
+        <p:spPr>
+          <a:xfrm>
+            <a:off x="7874122" y="4235703"/>
+            <a:ext cx="1309974" cy="1200329"/>
+          </a:xfrm>
+          <a:prstGeom prst="rect">
+            <a:avLst/>
+          </a:prstGeom>
+          <a:noFill/>
+        </p:spPr>
+        <p:txBody>
+          <a:bodyPr wrap="none" rtlCol="0">
+            <a:spAutoFit/>
+          </a:bodyPr>
+          <a:lstStyle/>
+          <a:p>
+            <a:r>
+              <a:rPr lang="en-US" sz="7200" dirty="0">
+                <a:latin typeface="Articulate" pitchFamily="2" charset="0"/>
+              </a:rPr>
+              <a:t>TILDA</a:t>
+            </a:r>
+          </a:p>
+        </p:txBody>
+      </p:sp>
+      <p:sp>
+        <p:nvSpPr>
+          <p:cNvPr id="29" name="TextBox 28">
+            <a:extLst>
+              <a:ext uri="{FF2B5EF4-FFF2-40B4-BE49-F238E27FC236}">
+                <a16:creationId xmlns:a16="http://schemas.microsoft.com/office/drawing/2014/main" id="{18DC1600-A4FE-4DE5-9231-3E8D7ABB2BAF}"/>
+              </a:ext>
+            </a:extLst>
+          </p:cNvPr>
+          <p:cNvSpPr txBox="1"/>
+          <p:nvPr/>
+        </p:nvSpPr>
+        <p:spPr>
+          <a:xfrm>
+            <a:off x="7874122" y="5223788"/>
+            <a:ext cx="1519968" cy="1200329"/>
+          </a:xfrm>
+          <a:prstGeom prst="rect">
+            <a:avLst/>
+          </a:prstGeom>
+          <a:noFill/>
+        </p:spPr>
+        <p:txBody>
+          <a:bodyPr wrap="none" rtlCol="0">
+            <a:spAutoFit/>
+          </a:bodyPr>
+          <a:lstStyle/>
+          <a:p>
+            <a:r>
+              <a:rPr lang="en-US" sz="7200" dirty="0">
+                <a:latin typeface="Breamcatcher" panose="04090904080B02020A04" pitchFamily="82" charset="0"/>
+              </a:rPr>
+              <a:t>TILDA</a:t>
+            </a:r>
+          </a:p>
+        </p:txBody>
+      </p:sp>
+    </p:spTree>
+    <p:extLst>
+      <p:ext uri="{BB962C8B-B14F-4D97-AF65-F5344CB8AC3E}">
+        <p14:creationId xmlns:p14="http://schemas.microsoft.com/office/powerpoint/2010/main" val="772323227"/>
+      </p:ext>
+    </p:extLst>
+  </p:cSld>
+  <p:clrMapOvr>
+    <a:masterClrMapping/>
+  </p:clrMapOvr>
+</p:sld>
+</file>
+
+<file path=ppt/slides/slide3.xml><?xml version="1.0" encoding="utf-8"?>
+<p:sld xmlns:a="http://schemas.openxmlformats.org/drawingml/2006/main" xmlns:r="http://schemas.openxmlformats.org/officeDocument/2006/relationships" xmlns:p="http://schemas.openxmlformats.org/presentationml/2006/main">
+  <p:cSld>
+    <p:spTree>
+      <p:nvGrpSpPr>
+        <p:cNvPr id="1" name=""/>
+        <p:cNvGrpSpPr/>
+        <p:nvPr/>
+      </p:nvGrpSpPr>
+      <p:grpSpPr>
+        <a:xfrm>
+          <a:off x="0" y="0"/>
+          <a:ext cx="0" cy="0"/>
+          <a:chOff x="0" y="0"/>
+          <a:chExt cx="0" cy="0"/>
+        </a:xfrm>
+      </p:grpSpPr>
+      <p:sp>
+        <p:nvSpPr>
+          <p:cNvPr id="12" name="TextBox 11">
+            <a:extLst>
+              <a:ext uri="{FF2B5EF4-FFF2-40B4-BE49-F238E27FC236}">
+                <a16:creationId xmlns:a16="http://schemas.microsoft.com/office/drawing/2014/main" id="{EADD92B2-8743-4314-819C-B0C8E5DCD7F6}"/>
+              </a:ext>
+            </a:extLst>
+          </p:cNvPr>
+          <p:cNvSpPr txBox="1"/>
+          <p:nvPr/>
+        </p:nvSpPr>
+        <p:spPr>
+          <a:xfrm>
+            <a:off x="904413" y="2919982"/>
+            <a:ext cx="1580882" cy="1200329"/>
+          </a:xfrm>
+          <a:prstGeom prst="rect">
+            <a:avLst/>
+          </a:prstGeom>
+          <a:noFill/>
+        </p:spPr>
+        <p:txBody>
+          <a:bodyPr wrap="none" rtlCol="0">
+            <a:spAutoFit/>
+          </a:bodyPr>
+          <a:lstStyle/>
+          <a:p>
+            <a:r>
+              <a:rPr lang="en-US" sz="7200" dirty="0">
+                <a:latin typeface="Grenadier NF" panose="02010503020304020304" pitchFamily="2" charset="0"/>
+              </a:rPr>
+              <a:t>T</a:t>
+            </a:r>
+            <a:r>
+              <a:rPr lang="en-US" sz="2800" dirty="0">
+                <a:latin typeface="Grenadier NF" panose="02010503020304020304" pitchFamily="2" charset="0"/>
+              </a:rPr>
+              <a:t> </a:t>
+            </a:r>
+            <a:r>
+              <a:rPr lang="en-US" sz="7200" dirty="0">
+                <a:latin typeface="Grenadier NF" panose="02010503020304020304" pitchFamily="2" charset="0"/>
+              </a:rPr>
+              <a:t>lda</a:t>
+            </a:r>
+          </a:p>
+        </p:txBody>
+      </p:sp>
+      <p:sp>
+        <p:nvSpPr>
+          <p:cNvPr id="16" name="Rectangle: Rounded Corners 15">
+            <a:extLst>
+              <a:ext uri="{FF2B5EF4-FFF2-40B4-BE49-F238E27FC236}">
+                <a16:creationId xmlns:a16="http://schemas.microsoft.com/office/drawing/2014/main" id="{FC8554FE-8227-428B-BFD9-A826B9D59EDE}"/>
+              </a:ext>
+            </a:extLst>
+          </p:cNvPr>
+          <p:cNvSpPr/>
+          <p:nvPr/>
+        </p:nvSpPr>
+        <p:spPr>
+          <a:xfrm>
+            <a:off x="867837" y="3113402"/>
+            <a:ext cx="254450" cy="73152"/>
+          </a:xfrm>
+          <a:prstGeom prst="roundRect">
+            <a:avLst>
+              <a:gd name="adj" fmla="val 0"/>
+            </a:avLst>
+          </a:prstGeom>
+          <a:solidFill>
+            <a:schemeClr val="tx1"/>
+          </a:solidFill>
+          <a:ln>
+            <a:noFill/>
+          </a:ln>
+        </p:spPr>
+        <p:style>
+          <a:lnRef idx="2">
+            <a:schemeClr val="accent1">
+              <a:shade val="50000"/>
+            </a:schemeClr>
+          </a:lnRef>
+          <a:fillRef idx="1">
+            <a:schemeClr val="accent1"/>
+          </a:fillRef>
+          <a:effectRef idx="0">
+            <a:schemeClr val="accent1"/>
+          </a:effectRef>
+          <a:fontRef idx="minor">
+            <a:schemeClr val="lt1"/>
+          </a:fontRef>
+        </p:style>
+        <p:txBody>
+          <a:bodyPr rtlCol="0" anchor="ctr"/>
+          <a:lstStyle/>
+          <a:p>
+            <a:pPr algn="ctr"/>
+            <a:endParaRPr lang="en-US"/>
+          </a:p>
+        </p:txBody>
+      </p:sp>
+      <p:sp>
+        <p:nvSpPr>
+          <p:cNvPr id="17" name="Rectangle: Rounded Corners 16">
+            <a:extLst>
+              <a:ext uri="{FF2B5EF4-FFF2-40B4-BE49-F238E27FC236}">
+                <a16:creationId xmlns:a16="http://schemas.microsoft.com/office/drawing/2014/main" id="{AA6F955F-B4EA-412F-AB5C-D9941166497F}"/>
+              </a:ext>
+            </a:extLst>
+          </p:cNvPr>
+          <p:cNvSpPr/>
+          <p:nvPr/>
+        </p:nvSpPr>
+        <p:spPr>
+          <a:xfrm>
+            <a:off x="846637" y="3105454"/>
+            <a:ext cx="73152" cy="85924"/>
+          </a:xfrm>
+          <a:prstGeom prst="roundRect">
+            <a:avLst>
+              <a:gd name="adj" fmla="val 50000"/>
+            </a:avLst>
+          </a:prstGeom>
+          <a:solidFill>
+            <a:schemeClr val="bg1"/>
+          </a:solidFill>
+          <a:ln>
+            <a:noFill/>
+          </a:ln>
+        </p:spPr>
+        <p:style>
+          <a:lnRef idx="2">
+            <a:schemeClr val="accent1">
+              <a:shade val="50000"/>
+            </a:schemeClr>
+          </a:lnRef>
+          <a:fillRef idx="1">
+            <a:schemeClr val="accent1"/>
+          </a:fillRef>
+          <a:effectRef idx="0">
+            <a:schemeClr val="accent1"/>
+          </a:effectRef>
+          <a:fontRef idx="minor">
+            <a:schemeClr val="lt1"/>
+          </a:fontRef>
+        </p:style>
+        <p:txBody>
+          <a:bodyPr rot="0" spcFirstLastPara="0" vertOverflow="overflow" horzOverflow="overflow" vert="horz" wrap="square" lIns="91440" tIns="45720" rIns="91440" bIns="45720" numCol="1" spcCol="0" rtlCol="0" fromWordArt="0" anchor="ctr" anchorCtr="0" forceAA="0" compatLnSpc="1">
+            <a:prstTxWarp prst="textNoShape">
+              <a:avLst/>
+            </a:prstTxWarp>
+            <a:noAutofit/>
+          </a:bodyPr>
+          <a:lstStyle/>
+          <a:p>
+            <a:pPr algn="ctr"/>
+            <a:endParaRPr lang="en-US"/>
+          </a:p>
+        </p:txBody>
+      </p:sp>
+      <p:sp>
+        <p:nvSpPr>
+          <p:cNvPr id="18" name="Rectangle: Rounded Corners 17">
+            <a:extLst>
+              <a:ext uri="{FF2B5EF4-FFF2-40B4-BE49-F238E27FC236}">
+                <a16:creationId xmlns:a16="http://schemas.microsoft.com/office/drawing/2014/main" id="{0776F393-8375-47D8-A4E4-2A92259F9DC1}"/>
+              </a:ext>
+            </a:extLst>
+          </p:cNvPr>
+          <p:cNvSpPr/>
+          <p:nvPr/>
+        </p:nvSpPr>
+        <p:spPr>
+          <a:xfrm>
+            <a:off x="1402076" y="3160005"/>
+            <a:ext cx="73152" cy="85924"/>
+          </a:xfrm>
+          <a:prstGeom prst="roundRect">
+            <a:avLst>
+              <a:gd name="adj" fmla="val 50000"/>
+            </a:avLst>
+          </a:prstGeom>
+          <a:solidFill>
+            <a:schemeClr val="bg1"/>
+          </a:solidFill>
+          <a:ln>
+            <a:noFill/>
+          </a:ln>
+        </p:spPr>
+        <p:style>
+          <a:lnRef idx="2">
+            <a:schemeClr val="accent1">
+              <a:shade val="50000"/>
+            </a:schemeClr>
+          </a:lnRef>
+          <a:fillRef idx="1">
+            <a:schemeClr val="accent1"/>
+          </a:fillRef>
+          <a:effectRef idx="0">
+            <a:schemeClr val="accent1"/>
+          </a:effectRef>
+          <a:fontRef idx="minor">
+            <a:schemeClr val="lt1"/>
+          </a:fontRef>
+        </p:style>
+        <p:txBody>
+          <a:bodyPr rot="0" spcFirstLastPara="0" vertOverflow="overflow" horzOverflow="overflow" vert="horz" wrap="square" lIns="91440" tIns="45720" rIns="91440" bIns="45720" numCol="1" spcCol="0" rtlCol="0" fromWordArt="0" anchor="ctr" anchorCtr="0" forceAA="0" compatLnSpc="1">
+            <a:prstTxWarp prst="textNoShape">
+              <a:avLst/>
+            </a:prstTxWarp>
+            <a:noAutofit/>
+          </a:bodyPr>
+          <a:lstStyle/>
+          <a:p>
+            <a:pPr algn="ctr"/>
+            <a:endParaRPr lang="en-US"/>
+          </a:p>
+        </p:txBody>
+      </p:sp>
+      <p:sp>
+        <p:nvSpPr>
+          <p:cNvPr id="19" name="Rectangle: Rounded Corners 18">
+            <a:extLst>
+              <a:ext uri="{FF2B5EF4-FFF2-40B4-BE49-F238E27FC236}">
+                <a16:creationId xmlns:a16="http://schemas.microsoft.com/office/drawing/2014/main" id="{26F335A1-F94C-4DC2-B2D4-DA86A1350186}"/>
+              </a:ext>
+            </a:extLst>
+          </p:cNvPr>
+          <p:cNvSpPr/>
+          <p:nvPr/>
+        </p:nvSpPr>
+        <p:spPr>
+          <a:xfrm>
+            <a:off x="2269228" y="3557350"/>
+            <a:ext cx="254450" cy="73152"/>
+          </a:xfrm>
+          <a:prstGeom prst="roundRect">
+            <a:avLst>
+              <a:gd name="adj" fmla="val 0"/>
+            </a:avLst>
+          </a:prstGeom>
+          <a:solidFill>
+            <a:schemeClr val="tx1"/>
+          </a:solidFill>
+          <a:ln>
+            <a:noFill/>
+          </a:ln>
+        </p:spPr>
+        <p:style>
+          <a:lnRef idx="2">
+            <a:schemeClr val="accent1">
+              <a:shade val="50000"/>
+            </a:schemeClr>
+          </a:lnRef>
+          <a:fillRef idx="1">
+            <a:schemeClr val="accent1"/>
+          </a:fillRef>
+          <a:effectRef idx="0">
+            <a:schemeClr val="accent1"/>
+          </a:effectRef>
+          <a:fontRef idx="minor">
+            <a:schemeClr val="lt1"/>
+          </a:fontRef>
+        </p:style>
+        <p:txBody>
+          <a:bodyPr rtlCol="0" anchor="ctr"/>
+          <a:lstStyle/>
+          <a:p>
+            <a:pPr algn="ctr"/>
+            <a:endParaRPr lang="en-US"/>
+          </a:p>
+        </p:txBody>
+      </p:sp>
+      <p:sp>
+        <p:nvSpPr>
+          <p:cNvPr id="20" name="Rectangle: Rounded Corners 19">
+            <a:extLst>
+              <a:ext uri="{FF2B5EF4-FFF2-40B4-BE49-F238E27FC236}">
+                <a16:creationId xmlns:a16="http://schemas.microsoft.com/office/drawing/2014/main" id="{E2DF8888-15EF-435F-9A9A-3639B7036D34}"/>
+              </a:ext>
+            </a:extLst>
+          </p:cNvPr>
+          <p:cNvSpPr/>
+          <p:nvPr/>
+        </p:nvSpPr>
+        <p:spPr>
+          <a:xfrm>
+            <a:off x="2498545" y="3549878"/>
+            <a:ext cx="73152" cy="85924"/>
+          </a:xfrm>
+          <a:prstGeom prst="roundRect">
+            <a:avLst>
+              <a:gd name="adj" fmla="val 50000"/>
+            </a:avLst>
+          </a:prstGeom>
+          <a:solidFill>
+            <a:schemeClr val="bg1"/>
+          </a:solidFill>
+          <a:ln>
+            <a:noFill/>
+          </a:ln>
+        </p:spPr>
+        <p:style>
+          <a:lnRef idx="2">
+            <a:schemeClr val="accent1">
+              <a:shade val="50000"/>
+            </a:schemeClr>
+          </a:lnRef>
+          <a:fillRef idx="1">
+            <a:schemeClr val="accent1"/>
+          </a:fillRef>
+          <a:effectRef idx="0">
+            <a:schemeClr val="accent1"/>
+          </a:effectRef>
+          <a:fontRef idx="minor">
+            <a:schemeClr val="lt1"/>
+          </a:fontRef>
+        </p:style>
+        <p:txBody>
+          <a:bodyPr rot="0" spcFirstLastPara="0" vertOverflow="overflow" horzOverflow="overflow" vert="horz" wrap="square" lIns="91440" tIns="45720" rIns="91440" bIns="45720" numCol="1" spcCol="0" rtlCol="0" fromWordArt="0" anchor="ctr" anchorCtr="0" forceAA="0" compatLnSpc="1">
+            <a:prstTxWarp prst="textNoShape">
+              <a:avLst/>
+            </a:prstTxWarp>
+            <a:noAutofit/>
+          </a:bodyPr>
+          <a:lstStyle/>
+          <a:p>
+            <a:pPr algn="ctr"/>
+            <a:endParaRPr lang="en-US"/>
+          </a:p>
+        </p:txBody>
+      </p:sp>
+      <p:sp>
+        <p:nvSpPr>
+          <p:cNvPr id="4" name="TextBox 3">
+            <a:extLst>
+              <a:ext uri="{FF2B5EF4-FFF2-40B4-BE49-F238E27FC236}">
+                <a16:creationId xmlns:a16="http://schemas.microsoft.com/office/drawing/2014/main" id="{96470405-DDB0-4C6D-BE1C-76AA691C106B}"/>
+              </a:ext>
+            </a:extLst>
+          </p:cNvPr>
+          <p:cNvSpPr txBox="1"/>
+          <p:nvPr/>
+        </p:nvSpPr>
+        <p:spPr>
+          <a:xfrm>
+            <a:off x="1171496" y="2919981"/>
+            <a:ext cx="298480" cy="1200329"/>
+          </a:xfrm>
+          <a:prstGeom prst="rect">
+            <a:avLst/>
+          </a:prstGeom>
+          <a:noFill/>
+        </p:spPr>
+        <p:txBody>
+          <a:bodyPr wrap="none" rtlCol="0">
+            <a:spAutoFit/>
+          </a:bodyPr>
+          <a:lstStyle/>
+          <a:p>
+            <a:r>
+              <a:rPr lang="en-US" sz="7200" dirty="0">
+                <a:latin typeface="Grenadier NF" panose="02010503020304020304" pitchFamily="2" charset="0"/>
+              </a:rPr>
+              <a:t>i</a:t>
+            </a:r>
+          </a:p>
+        </p:txBody>
+      </p:sp>
+      <p:sp>
+        <p:nvSpPr>
+          <p:cNvPr id="9" name="Rectangle: Rounded Corners 8">
+            <a:extLst>
+              <a:ext uri="{FF2B5EF4-FFF2-40B4-BE49-F238E27FC236}">
+                <a16:creationId xmlns:a16="http://schemas.microsoft.com/office/drawing/2014/main" id="{0D3336B6-2542-43AF-B187-72D927F101B3}"/>
+              </a:ext>
+            </a:extLst>
+          </p:cNvPr>
+          <p:cNvSpPr/>
+          <p:nvPr/>
+        </p:nvSpPr>
+        <p:spPr>
+          <a:xfrm>
+            <a:off x="1282365" y="3294670"/>
+            <a:ext cx="73152" cy="53865"/>
+          </a:xfrm>
+          <a:prstGeom prst="roundRect">
+            <a:avLst>
+              <a:gd name="adj" fmla="val 0"/>
+            </a:avLst>
+          </a:prstGeom>
+          <a:solidFill>
+            <a:schemeClr val="bg1"/>
+          </a:solidFill>
+          <a:ln>
+            <a:noFill/>
+          </a:ln>
+        </p:spPr>
+        <p:style>
+          <a:lnRef idx="2">
+            <a:schemeClr val="accent1">
+              <a:shade val="50000"/>
+            </a:schemeClr>
+          </a:lnRef>
+          <a:fillRef idx="1">
+            <a:schemeClr val="accent1"/>
+          </a:fillRef>
+          <a:effectRef idx="0">
+            <a:schemeClr val="accent1"/>
+          </a:effectRef>
+          <a:fontRef idx="minor">
+            <a:schemeClr val="lt1"/>
+          </a:fontRef>
+        </p:style>
+        <p:txBody>
+          <a:bodyPr rtlCol="0" anchor="ctr"/>
+          <a:lstStyle/>
+          <a:p>
+            <a:pPr algn="ctr"/>
+            <a:endParaRPr lang="en-US"/>
+          </a:p>
+        </p:txBody>
+      </p:sp>
+      <p:sp>
+        <p:nvSpPr>
+          <p:cNvPr id="11" name="Rectangle: Rounded Corners 10">
+            <a:extLst>
+              <a:ext uri="{FF2B5EF4-FFF2-40B4-BE49-F238E27FC236}">
+                <a16:creationId xmlns:a16="http://schemas.microsoft.com/office/drawing/2014/main" id="{562598C8-2A87-4865-B185-B0F50231EA3E}"/>
+              </a:ext>
+            </a:extLst>
+          </p:cNvPr>
+          <p:cNvSpPr/>
+          <p:nvPr/>
+        </p:nvSpPr>
+        <p:spPr>
+          <a:xfrm>
+            <a:off x="1282365" y="3272429"/>
+            <a:ext cx="73152" cy="53865"/>
+          </a:xfrm>
+          <a:prstGeom prst="roundRect">
+            <a:avLst>
+              <a:gd name="adj" fmla="val 50000"/>
+            </a:avLst>
+          </a:prstGeom>
+          <a:solidFill>
+            <a:schemeClr val="bg1"/>
+          </a:solidFill>
+          <a:ln>
+            <a:noFill/>
+          </a:ln>
+        </p:spPr>
+        <p:style>
+          <a:lnRef idx="2">
+            <a:schemeClr val="accent1">
+              <a:shade val="50000"/>
+            </a:schemeClr>
+          </a:lnRef>
+          <a:fillRef idx="1">
+            <a:schemeClr val="accent1"/>
+          </a:fillRef>
+          <a:effectRef idx="0">
+            <a:schemeClr val="accent1"/>
+          </a:effectRef>
+          <a:fontRef idx="minor">
+            <a:schemeClr val="lt1"/>
+          </a:fontRef>
+        </p:style>
+        <p:txBody>
+          <a:bodyPr rot="0" spcFirstLastPara="0" vertOverflow="overflow" horzOverflow="overflow" vert="horz" wrap="square" lIns="91440" tIns="45720" rIns="91440" bIns="45720" numCol="1" spcCol="0" rtlCol="0" fromWordArt="0" anchor="ctr" anchorCtr="0" forceAA="0" compatLnSpc="1">
+            <a:prstTxWarp prst="textNoShape">
+              <a:avLst/>
+            </a:prstTxWarp>
+            <a:noAutofit/>
+          </a:bodyPr>
+          <a:lstStyle/>
+          <a:p>
+            <a:pPr algn="ctr"/>
+            <a:endParaRPr lang="en-US"/>
+          </a:p>
+        </p:txBody>
+      </p:sp>
+    </p:spTree>
+    <p:extLst>
+      <p:ext uri="{BB962C8B-B14F-4D97-AF65-F5344CB8AC3E}">
+        <p14:creationId xmlns:p14="http://schemas.microsoft.com/office/powerpoint/2010/main" val="1870476661"/>
+      </p:ext>
+    </p:extLst>
+  </p:cSld>
+  <p:clrMapOvr>
+    <a:masterClrMapping/>
+  </p:clrMapOvr>
+</p:sld>
+</file>
+
 <file path=ppt/theme/theme1.xml><?xml version="1.0" encoding="utf-8"?>
 <a:theme xmlns:a="http://schemas.openxmlformats.org/drawingml/2006/main" name="Office Theme">
   <a:themeElements>

</xml_diff>

<commit_message>
#433 more updates to landing pages and icons
</commit_message>
<xml_diff>
--- a/docs/documentation/tilda-logo.pptx
+++ b/docs/documentation/tilda-logo.pptx
@@ -8,6 +8,7 @@
     <p:sldId id="256" r:id="rId2"/>
     <p:sldId id="257" r:id="rId3"/>
     <p:sldId id="258" r:id="rId4"/>
+    <p:sldId id="259" r:id="rId5"/>
   </p:sldIdLst>
   <p:sldSz cx="12192000" cy="6858000"/>
   <p:notesSz cx="6858000" cy="9144000"/>
@@ -3342,18 +3343,18 @@
         </p:nvSpPr>
         <p:spPr>
           <a:xfrm>
-            <a:off x="4955029" y="2019744"/>
-            <a:ext cx="1920240" cy="1920240"/>
+            <a:off x="565600" y="1506280"/>
+            <a:ext cx="1677926" cy="1677926"/>
           </a:xfrm>
           <a:prstGeom prst="roundRect">
             <a:avLst>
-              <a:gd name="adj" fmla="val 18182"/>
+              <a:gd name="adj" fmla="val 3257"/>
             </a:avLst>
           </a:prstGeom>
           <a:solidFill>
             <a:srgbClr val="0099CC"/>
           </a:solidFill>
-          <a:ln w="114300">
+          <a:ln w="38100">
             <a:solidFill>
               <a:srgbClr val="336699"/>
             </a:solidFill>
@@ -3396,7 +3397,7 @@
         </p:nvSpPr>
         <p:spPr>
           <a:xfrm>
-            <a:off x="4922377" y="524782"/>
+            <a:off x="459559" y="-130311"/>
             <a:ext cx="1811708" cy="3770263"/>
           </a:xfrm>
           <a:prstGeom prst="rect">
@@ -3436,7 +3437,7 @@
         </p:nvSpPr>
         <p:spPr>
           <a:xfrm rot="5400000">
-            <a:off x="4987255" y="1155747"/>
+            <a:off x="524437" y="500654"/>
             <a:ext cx="1811708" cy="3770263"/>
           </a:xfrm>
           <a:prstGeom prst="rect">
@@ -3462,6 +3463,159 @@
           </a:p>
         </p:txBody>
       </p:sp>
+      <p:grpSp>
+        <p:nvGrpSpPr>
+          <p:cNvPr id="2" name="Group 1">
+            <a:extLst>
+              <a:ext uri="{FF2B5EF4-FFF2-40B4-BE49-F238E27FC236}">
+                <a16:creationId xmlns:a16="http://schemas.microsoft.com/office/drawing/2014/main" id="{C524EAFA-937C-427B-AE91-681405E99746}"/>
+              </a:ext>
+            </a:extLst>
+          </p:cNvPr>
+          <p:cNvGrpSpPr/>
+          <p:nvPr/>
+        </p:nvGrpSpPr>
+        <p:grpSpPr>
+          <a:xfrm>
+            <a:off x="558776" y="1328248"/>
+            <a:ext cx="1285718" cy="1264018"/>
+            <a:chOff x="3627476" y="152341"/>
+            <a:chExt cx="1285718" cy="1264018"/>
+          </a:xfrm>
+        </p:grpSpPr>
+        <p:sp>
+          <p:nvSpPr>
+            <p:cNvPr id="7" name="TextBox 6">
+              <a:extLst>
+                <a:ext uri="{FF2B5EF4-FFF2-40B4-BE49-F238E27FC236}">
+                  <a16:creationId xmlns:a16="http://schemas.microsoft.com/office/drawing/2014/main" id="{AAEC2FE4-9B04-489D-88CC-C0A1CCC851AE}"/>
+                </a:ext>
+              </a:extLst>
+            </p:cNvPr>
+            <p:cNvSpPr txBox="1"/>
+            <p:nvPr/>
+          </p:nvSpPr>
+          <p:spPr>
+            <a:xfrm>
+              <a:off x="3820634" y="152341"/>
+              <a:ext cx="1092560" cy="1200329"/>
+            </a:xfrm>
+            <a:prstGeom prst="rect">
+              <a:avLst/>
+            </a:prstGeom>
+            <a:noFill/>
+          </p:spPr>
+          <p:txBody>
+            <a:bodyPr wrap="square" rtlCol="0">
+              <a:spAutoFit/>
+            </a:bodyPr>
+            <a:lstStyle/>
+            <a:p>
+              <a:r>
+                <a:rPr lang="en-US" sz="7200" b="1" dirty="0">
+                  <a:solidFill>
+                    <a:schemeClr val="accent2"/>
+                  </a:solidFill>
+                  <a:latin typeface="Juice ITC" panose="04040403040A02020202" pitchFamily="82" charset="0"/>
+                </a:rPr>
+                <a:t>~</a:t>
+              </a:r>
+            </a:p>
+          </p:txBody>
+        </p:sp>
+        <p:sp>
+          <p:nvSpPr>
+            <p:cNvPr id="8" name="TextBox 7">
+              <a:extLst>
+                <a:ext uri="{FF2B5EF4-FFF2-40B4-BE49-F238E27FC236}">
+                  <a16:creationId xmlns:a16="http://schemas.microsoft.com/office/drawing/2014/main" id="{B8407BE5-6A05-4275-BCB0-28BA85744E0B}"/>
+                </a:ext>
+              </a:extLst>
+            </p:cNvPr>
+            <p:cNvSpPr txBox="1"/>
+            <p:nvPr/>
+          </p:nvSpPr>
+          <p:spPr>
+            <a:xfrm>
+              <a:off x="3627476" y="216030"/>
+              <a:ext cx="750572" cy="1200329"/>
+            </a:xfrm>
+            <a:prstGeom prst="rect">
+              <a:avLst/>
+            </a:prstGeom>
+            <a:noFill/>
+          </p:spPr>
+          <p:txBody>
+            <a:bodyPr wrap="square" rtlCol="0">
+              <a:spAutoFit/>
+            </a:bodyPr>
+            <a:lstStyle/>
+            <a:p>
+              <a:r>
+                <a:rPr lang="en-US" sz="7200" b="1" dirty="0">
+                  <a:solidFill>
+                    <a:schemeClr val="accent2"/>
+                  </a:solidFill>
+                  <a:latin typeface="Juice ITC" panose="04040403040A02020202" pitchFamily="82" charset="0"/>
+                </a:rPr>
+                <a:t>~</a:t>
+              </a:r>
+            </a:p>
+          </p:txBody>
+        </p:sp>
+        <p:sp>
+          <p:nvSpPr>
+            <p:cNvPr id="9" name="Rectangle: Rounded Corners 8">
+              <a:extLst>
+                <a:ext uri="{FF2B5EF4-FFF2-40B4-BE49-F238E27FC236}">
+                  <a16:creationId xmlns:a16="http://schemas.microsoft.com/office/drawing/2014/main" id="{384422AA-A7D8-4930-9158-3316E87135D5}"/>
+                </a:ext>
+              </a:extLst>
+            </p:cNvPr>
+            <p:cNvSpPr/>
+            <p:nvPr/>
+          </p:nvSpPr>
+          <p:spPr>
+            <a:xfrm>
+              <a:off x="3691719" y="708342"/>
+              <a:ext cx="265395" cy="175318"/>
+            </a:xfrm>
+            <a:prstGeom prst="roundRect">
+              <a:avLst>
+                <a:gd name="adj" fmla="val 0"/>
+              </a:avLst>
+            </a:prstGeom>
+            <a:solidFill>
+              <a:srgbClr val="0099CC"/>
+            </a:solidFill>
+            <a:ln w="38100">
+              <a:noFill/>
+            </a:ln>
+          </p:spPr>
+          <p:style>
+            <a:lnRef idx="2">
+              <a:schemeClr val="accent2"/>
+            </a:lnRef>
+            <a:fillRef idx="1">
+              <a:schemeClr val="lt1"/>
+            </a:fillRef>
+            <a:effectRef idx="0">
+              <a:schemeClr val="accent2"/>
+            </a:effectRef>
+            <a:fontRef idx="minor">
+              <a:schemeClr val="dk1"/>
+            </a:fontRef>
+          </p:style>
+          <p:txBody>
+            <a:bodyPr rtlCol="0" anchor="ctr"/>
+            <a:lstStyle/>
+            <a:p>
+              <a:pPr algn="ctr"/>
+              <a:endParaRPr lang="en-US" sz="1400"/>
+            </a:p>
+          </p:txBody>
+        </p:sp>
+      </p:grpSp>
     </p:spTree>
     <p:extLst>
       <p:ext uri="{BB962C8B-B14F-4D97-AF65-F5344CB8AC3E}">
@@ -4477,12 +4631,855 @@
           <a:chExt cx="0" cy="0"/>
         </a:xfrm>
       </p:grpSpPr>
-      <p:sp>
-        <p:nvSpPr>
-          <p:cNvPr id="12" name="TextBox 11">
-            <a:extLst>
-              <a:ext uri="{FF2B5EF4-FFF2-40B4-BE49-F238E27FC236}">
-                <a16:creationId xmlns:a16="http://schemas.microsoft.com/office/drawing/2014/main" id="{EADD92B2-8743-4314-819C-B0C8E5DCD7F6}"/>
+      <p:grpSp>
+        <p:nvGrpSpPr>
+          <p:cNvPr id="5" name="Group 4">
+            <a:extLst>
+              <a:ext uri="{FF2B5EF4-FFF2-40B4-BE49-F238E27FC236}">
+                <a16:creationId xmlns:a16="http://schemas.microsoft.com/office/drawing/2014/main" id="{29D337BC-8AF6-48CE-853B-52716877356B}"/>
+              </a:ext>
+            </a:extLst>
+          </p:cNvPr>
+          <p:cNvGrpSpPr/>
+          <p:nvPr/>
+        </p:nvGrpSpPr>
+        <p:grpSpPr>
+          <a:xfrm>
+            <a:off x="2573078" y="1855456"/>
+            <a:ext cx="1725060" cy="1200330"/>
+            <a:chOff x="696511" y="2428662"/>
+            <a:chExt cx="1725060" cy="1200330"/>
+          </a:xfrm>
+        </p:grpSpPr>
+        <p:sp>
+          <p:nvSpPr>
+            <p:cNvPr id="12" name="TextBox 11">
+              <a:extLst>
+                <a:ext uri="{FF2B5EF4-FFF2-40B4-BE49-F238E27FC236}">
+                  <a16:creationId xmlns:a16="http://schemas.microsoft.com/office/drawing/2014/main" id="{EADD92B2-8743-4314-819C-B0C8E5DCD7F6}"/>
+                </a:ext>
+              </a:extLst>
+            </p:cNvPr>
+            <p:cNvSpPr txBox="1"/>
+            <p:nvPr/>
+          </p:nvSpPr>
+          <p:spPr>
+            <a:xfrm>
+              <a:off x="754287" y="2428663"/>
+              <a:ext cx="1580882" cy="1200329"/>
+            </a:xfrm>
+            <a:prstGeom prst="rect">
+              <a:avLst/>
+            </a:prstGeom>
+            <a:noFill/>
+          </p:spPr>
+          <p:txBody>
+            <a:bodyPr wrap="none" rtlCol="0">
+              <a:spAutoFit/>
+            </a:bodyPr>
+            <a:lstStyle/>
+            <a:p>
+              <a:r>
+                <a:rPr lang="en-US" sz="7200" dirty="0">
+                  <a:latin typeface="Grenadier NF" panose="02010503020304020304" pitchFamily="2" charset="0"/>
+                </a:rPr>
+                <a:t>T</a:t>
+              </a:r>
+              <a:r>
+                <a:rPr lang="en-US" sz="2800" dirty="0">
+                  <a:latin typeface="Grenadier NF" panose="02010503020304020304" pitchFamily="2" charset="0"/>
+                </a:rPr>
+                <a:t> </a:t>
+              </a:r>
+              <a:r>
+                <a:rPr lang="en-US" sz="7200" dirty="0">
+                  <a:latin typeface="Grenadier NF" panose="02010503020304020304" pitchFamily="2" charset="0"/>
+                </a:rPr>
+                <a:t>lda</a:t>
+              </a:r>
+            </a:p>
+          </p:txBody>
+        </p:sp>
+        <p:sp>
+          <p:nvSpPr>
+            <p:cNvPr id="16" name="Rectangle: Rounded Corners 15">
+              <a:extLst>
+                <a:ext uri="{FF2B5EF4-FFF2-40B4-BE49-F238E27FC236}">
+                  <a16:creationId xmlns:a16="http://schemas.microsoft.com/office/drawing/2014/main" id="{FC8554FE-8227-428B-BFD9-A826B9D59EDE}"/>
+                </a:ext>
+              </a:extLst>
+            </p:cNvPr>
+            <p:cNvSpPr/>
+            <p:nvPr/>
+          </p:nvSpPr>
+          <p:spPr>
+            <a:xfrm>
+              <a:off x="717711" y="2622083"/>
+              <a:ext cx="254450" cy="73152"/>
+            </a:xfrm>
+            <a:prstGeom prst="roundRect">
+              <a:avLst>
+                <a:gd name="adj" fmla="val 0"/>
+              </a:avLst>
+            </a:prstGeom>
+            <a:solidFill>
+              <a:schemeClr val="tx1"/>
+            </a:solidFill>
+            <a:ln>
+              <a:noFill/>
+            </a:ln>
+          </p:spPr>
+          <p:style>
+            <a:lnRef idx="2">
+              <a:schemeClr val="accent1">
+                <a:shade val="50000"/>
+              </a:schemeClr>
+            </a:lnRef>
+            <a:fillRef idx="1">
+              <a:schemeClr val="accent1"/>
+            </a:fillRef>
+            <a:effectRef idx="0">
+              <a:schemeClr val="accent1"/>
+            </a:effectRef>
+            <a:fontRef idx="minor">
+              <a:schemeClr val="lt1"/>
+            </a:fontRef>
+          </p:style>
+          <p:txBody>
+            <a:bodyPr rtlCol="0" anchor="ctr"/>
+            <a:lstStyle/>
+            <a:p>
+              <a:pPr algn="ctr"/>
+              <a:endParaRPr lang="en-US"/>
+            </a:p>
+          </p:txBody>
+        </p:sp>
+        <p:sp>
+          <p:nvSpPr>
+            <p:cNvPr id="17" name="Rectangle: Rounded Corners 16">
+              <a:extLst>
+                <a:ext uri="{FF2B5EF4-FFF2-40B4-BE49-F238E27FC236}">
+                  <a16:creationId xmlns:a16="http://schemas.microsoft.com/office/drawing/2014/main" id="{AA6F955F-B4EA-412F-AB5C-D9941166497F}"/>
+                </a:ext>
+              </a:extLst>
+            </p:cNvPr>
+            <p:cNvSpPr/>
+            <p:nvPr/>
+          </p:nvSpPr>
+          <p:spPr>
+            <a:xfrm>
+              <a:off x="696511" y="2614135"/>
+              <a:ext cx="73152" cy="85924"/>
+            </a:xfrm>
+            <a:prstGeom prst="roundRect">
+              <a:avLst>
+                <a:gd name="adj" fmla="val 50000"/>
+              </a:avLst>
+            </a:prstGeom>
+            <a:solidFill>
+              <a:schemeClr val="bg1"/>
+            </a:solidFill>
+            <a:ln>
+              <a:noFill/>
+            </a:ln>
+          </p:spPr>
+          <p:style>
+            <a:lnRef idx="2">
+              <a:schemeClr val="accent1">
+                <a:shade val="50000"/>
+              </a:schemeClr>
+            </a:lnRef>
+            <a:fillRef idx="1">
+              <a:schemeClr val="accent1"/>
+            </a:fillRef>
+            <a:effectRef idx="0">
+              <a:schemeClr val="accent1"/>
+            </a:effectRef>
+            <a:fontRef idx="minor">
+              <a:schemeClr val="lt1"/>
+            </a:fontRef>
+          </p:style>
+          <p:txBody>
+            <a:bodyPr rot="0" spcFirstLastPara="0" vertOverflow="overflow" horzOverflow="overflow" vert="horz" wrap="square" lIns="91440" tIns="45720" rIns="91440" bIns="45720" numCol="1" spcCol="0" rtlCol="0" fromWordArt="0" anchor="ctr" anchorCtr="0" forceAA="0" compatLnSpc="1">
+              <a:prstTxWarp prst="textNoShape">
+                <a:avLst/>
+              </a:prstTxWarp>
+              <a:noAutofit/>
+            </a:bodyPr>
+            <a:lstStyle/>
+            <a:p>
+              <a:pPr algn="ctr"/>
+              <a:endParaRPr lang="en-US"/>
+            </a:p>
+          </p:txBody>
+        </p:sp>
+        <p:sp>
+          <p:nvSpPr>
+            <p:cNvPr id="18" name="Rectangle: Rounded Corners 17">
+              <a:extLst>
+                <a:ext uri="{FF2B5EF4-FFF2-40B4-BE49-F238E27FC236}">
+                  <a16:creationId xmlns:a16="http://schemas.microsoft.com/office/drawing/2014/main" id="{0776F393-8375-47D8-A4E4-2A92259F9DC1}"/>
+                </a:ext>
+              </a:extLst>
+            </p:cNvPr>
+            <p:cNvSpPr/>
+            <p:nvPr/>
+          </p:nvSpPr>
+          <p:spPr>
+            <a:xfrm>
+              <a:off x="1251950" y="2668686"/>
+              <a:ext cx="73152" cy="85924"/>
+            </a:xfrm>
+            <a:prstGeom prst="roundRect">
+              <a:avLst>
+                <a:gd name="adj" fmla="val 50000"/>
+              </a:avLst>
+            </a:prstGeom>
+            <a:solidFill>
+              <a:schemeClr val="bg1"/>
+            </a:solidFill>
+            <a:ln>
+              <a:noFill/>
+            </a:ln>
+          </p:spPr>
+          <p:style>
+            <a:lnRef idx="2">
+              <a:schemeClr val="accent1">
+                <a:shade val="50000"/>
+              </a:schemeClr>
+            </a:lnRef>
+            <a:fillRef idx="1">
+              <a:schemeClr val="accent1"/>
+            </a:fillRef>
+            <a:effectRef idx="0">
+              <a:schemeClr val="accent1"/>
+            </a:effectRef>
+            <a:fontRef idx="minor">
+              <a:schemeClr val="lt1"/>
+            </a:fontRef>
+          </p:style>
+          <p:txBody>
+            <a:bodyPr rot="0" spcFirstLastPara="0" vertOverflow="overflow" horzOverflow="overflow" vert="horz" wrap="square" lIns="91440" tIns="45720" rIns="91440" bIns="45720" numCol="1" spcCol="0" rtlCol="0" fromWordArt="0" anchor="ctr" anchorCtr="0" forceAA="0" compatLnSpc="1">
+              <a:prstTxWarp prst="textNoShape">
+                <a:avLst/>
+              </a:prstTxWarp>
+              <a:noAutofit/>
+            </a:bodyPr>
+            <a:lstStyle/>
+            <a:p>
+              <a:pPr algn="ctr"/>
+              <a:endParaRPr lang="en-US"/>
+            </a:p>
+          </p:txBody>
+        </p:sp>
+        <p:sp>
+          <p:nvSpPr>
+            <p:cNvPr id="19" name="Rectangle: Rounded Corners 18">
+              <a:extLst>
+                <a:ext uri="{FF2B5EF4-FFF2-40B4-BE49-F238E27FC236}">
+                  <a16:creationId xmlns:a16="http://schemas.microsoft.com/office/drawing/2014/main" id="{26F335A1-F94C-4DC2-B2D4-DA86A1350186}"/>
+                </a:ext>
+              </a:extLst>
+            </p:cNvPr>
+            <p:cNvSpPr/>
+            <p:nvPr/>
+          </p:nvSpPr>
+          <p:spPr>
+            <a:xfrm>
+              <a:off x="2119102" y="3066031"/>
+              <a:ext cx="254450" cy="73152"/>
+            </a:xfrm>
+            <a:prstGeom prst="roundRect">
+              <a:avLst>
+                <a:gd name="adj" fmla="val 0"/>
+              </a:avLst>
+            </a:prstGeom>
+            <a:solidFill>
+              <a:schemeClr val="tx1"/>
+            </a:solidFill>
+            <a:ln>
+              <a:noFill/>
+            </a:ln>
+          </p:spPr>
+          <p:style>
+            <a:lnRef idx="2">
+              <a:schemeClr val="accent1">
+                <a:shade val="50000"/>
+              </a:schemeClr>
+            </a:lnRef>
+            <a:fillRef idx="1">
+              <a:schemeClr val="accent1"/>
+            </a:fillRef>
+            <a:effectRef idx="0">
+              <a:schemeClr val="accent1"/>
+            </a:effectRef>
+            <a:fontRef idx="minor">
+              <a:schemeClr val="lt1"/>
+            </a:fontRef>
+          </p:style>
+          <p:txBody>
+            <a:bodyPr rtlCol="0" anchor="ctr"/>
+            <a:lstStyle/>
+            <a:p>
+              <a:pPr algn="ctr"/>
+              <a:endParaRPr lang="en-US"/>
+            </a:p>
+          </p:txBody>
+        </p:sp>
+        <p:sp>
+          <p:nvSpPr>
+            <p:cNvPr id="20" name="Rectangle: Rounded Corners 19">
+              <a:extLst>
+                <a:ext uri="{FF2B5EF4-FFF2-40B4-BE49-F238E27FC236}">
+                  <a16:creationId xmlns:a16="http://schemas.microsoft.com/office/drawing/2014/main" id="{E2DF8888-15EF-435F-9A9A-3639B7036D34}"/>
+                </a:ext>
+              </a:extLst>
+            </p:cNvPr>
+            <p:cNvSpPr/>
+            <p:nvPr/>
+          </p:nvSpPr>
+          <p:spPr>
+            <a:xfrm>
+              <a:off x="2348419" y="3058559"/>
+              <a:ext cx="73152" cy="85924"/>
+            </a:xfrm>
+            <a:prstGeom prst="roundRect">
+              <a:avLst>
+                <a:gd name="adj" fmla="val 50000"/>
+              </a:avLst>
+            </a:prstGeom>
+            <a:solidFill>
+              <a:schemeClr val="bg1"/>
+            </a:solidFill>
+            <a:ln>
+              <a:noFill/>
+            </a:ln>
+          </p:spPr>
+          <p:style>
+            <a:lnRef idx="2">
+              <a:schemeClr val="accent1">
+                <a:shade val="50000"/>
+              </a:schemeClr>
+            </a:lnRef>
+            <a:fillRef idx="1">
+              <a:schemeClr val="accent1"/>
+            </a:fillRef>
+            <a:effectRef idx="0">
+              <a:schemeClr val="accent1"/>
+            </a:effectRef>
+            <a:fontRef idx="minor">
+              <a:schemeClr val="lt1"/>
+            </a:fontRef>
+          </p:style>
+          <p:txBody>
+            <a:bodyPr rot="0" spcFirstLastPara="0" vertOverflow="overflow" horzOverflow="overflow" vert="horz" wrap="square" lIns="91440" tIns="45720" rIns="91440" bIns="45720" numCol="1" spcCol="0" rtlCol="0" fromWordArt="0" anchor="ctr" anchorCtr="0" forceAA="0" compatLnSpc="1">
+              <a:prstTxWarp prst="textNoShape">
+                <a:avLst/>
+              </a:prstTxWarp>
+              <a:noAutofit/>
+            </a:bodyPr>
+            <a:lstStyle/>
+            <a:p>
+              <a:pPr algn="ctr"/>
+              <a:endParaRPr lang="en-US"/>
+            </a:p>
+          </p:txBody>
+        </p:sp>
+        <p:sp>
+          <p:nvSpPr>
+            <p:cNvPr id="4" name="TextBox 3">
+              <a:extLst>
+                <a:ext uri="{FF2B5EF4-FFF2-40B4-BE49-F238E27FC236}">
+                  <a16:creationId xmlns:a16="http://schemas.microsoft.com/office/drawing/2014/main" id="{96470405-DDB0-4C6D-BE1C-76AA691C106B}"/>
+                </a:ext>
+              </a:extLst>
+            </p:cNvPr>
+            <p:cNvSpPr txBox="1"/>
+            <p:nvPr/>
+          </p:nvSpPr>
+          <p:spPr>
+            <a:xfrm>
+              <a:off x="1021370" y="2428662"/>
+              <a:ext cx="298480" cy="1200329"/>
+            </a:xfrm>
+            <a:prstGeom prst="rect">
+              <a:avLst/>
+            </a:prstGeom>
+            <a:noFill/>
+          </p:spPr>
+          <p:txBody>
+            <a:bodyPr wrap="none" rtlCol="0">
+              <a:spAutoFit/>
+            </a:bodyPr>
+            <a:lstStyle/>
+            <a:p>
+              <a:r>
+                <a:rPr lang="en-US" sz="7200" dirty="0">
+                  <a:latin typeface="Grenadier NF" panose="02010503020304020304" pitchFamily="2" charset="0"/>
+                </a:rPr>
+                <a:t>i</a:t>
+              </a:r>
+            </a:p>
+          </p:txBody>
+        </p:sp>
+        <p:sp>
+          <p:nvSpPr>
+            <p:cNvPr id="9" name="Rectangle: Rounded Corners 8">
+              <a:extLst>
+                <a:ext uri="{FF2B5EF4-FFF2-40B4-BE49-F238E27FC236}">
+                  <a16:creationId xmlns:a16="http://schemas.microsoft.com/office/drawing/2014/main" id="{0D3336B6-2542-43AF-B187-72D927F101B3}"/>
+                </a:ext>
+              </a:extLst>
+            </p:cNvPr>
+            <p:cNvSpPr/>
+            <p:nvPr/>
+          </p:nvSpPr>
+          <p:spPr>
+            <a:xfrm>
+              <a:off x="1132239" y="2803351"/>
+              <a:ext cx="73152" cy="53865"/>
+            </a:xfrm>
+            <a:prstGeom prst="roundRect">
+              <a:avLst>
+                <a:gd name="adj" fmla="val 0"/>
+              </a:avLst>
+            </a:prstGeom>
+            <a:solidFill>
+              <a:schemeClr val="bg1"/>
+            </a:solidFill>
+            <a:ln>
+              <a:noFill/>
+            </a:ln>
+          </p:spPr>
+          <p:style>
+            <a:lnRef idx="2">
+              <a:schemeClr val="accent1">
+                <a:shade val="50000"/>
+              </a:schemeClr>
+            </a:lnRef>
+            <a:fillRef idx="1">
+              <a:schemeClr val="accent1"/>
+            </a:fillRef>
+            <a:effectRef idx="0">
+              <a:schemeClr val="accent1"/>
+            </a:effectRef>
+            <a:fontRef idx="minor">
+              <a:schemeClr val="lt1"/>
+            </a:fontRef>
+          </p:style>
+          <p:txBody>
+            <a:bodyPr rtlCol="0" anchor="ctr"/>
+            <a:lstStyle/>
+            <a:p>
+              <a:pPr algn="ctr"/>
+              <a:endParaRPr lang="en-US"/>
+            </a:p>
+          </p:txBody>
+        </p:sp>
+        <p:sp>
+          <p:nvSpPr>
+            <p:cNvPr id="11" name="Rectangle: Rounded Corners 10">
+              <a:extLst>
+                <a:ext uri="{FF2B5EF4-FFF2-40B4-BE49-F238E27FC236}">
+                  <a16:creationId xmlns:a16="http://schemas.microsoft.com/office/drawing/2014/main" id="{562598C8-2A87-4865-B185-B0F50231EA3E}"/>
+                </a:ext>
+              </a:extLst>
+            </p:cNvPr>
+            <p:cNvSpPr/>
+            <p:nvPr/>
+          </p:nvSpPr>
+          <p:spPr>
+            <a:xfrm>
+              <a:off x="1132239" y="2781110"/>
+              <a:ext cx="73152" cy="53865"/>
+            </a:xfrm>
+            <a:prstGeom prst="roundRect">
+              <a:avLst>
+                <a:gd name="adj" fmla="val 50000"/>
+              </a:avLst>
+            </a:prstGeom>
+            <a:solidFill>
+              <a:schemeClr val="bg1"/>
+            </a:solidFill>
+            <a:ln>
+              <a:noFill/>
+            </a:ln>
+          </p:spPr>
+          <p:style>
+            <a:lnRef idx="2">
+              <a:schemeClr val="accent1">
+                <a:shade val="50000"/>
+              </a:schemeClr>
+            </a:lnRef>
+            <a:fillRef idx="1">
+              <a:schemeClr val="accent1"/>
+            </a:fillRef>
+            <a:effectRef idx="0">
+              <a:schemeClr val="accent1"/>
+            </a:effectRef>
+            <a:fontRef idx="minor">
+              <a:schemeClr val="lt1"/>
+            </a:fontRef>
+          </p:style>
+          <p:txBody>
+            <a:bodyPr rot="0" spcFirstLastPara="0" vertOverflow="overflow" horzOverflow="overflow" vert="horz" wrap="square" lIns="91440" tIns="45720" rIns="91440" bIns="45720" numCol="1" spcCol="0" rtlCol="0" fromWordArt="0" anchor="ctr" anchorCtr="0" forceAA="0" compatLnSpc="1">
+              <a:prstTxWarp prst="textNoShape">
+                <a:avLst/>
+              </a:prstTxWarp>
+              <a:noAutofit/>
+            </a:bodyPr>
+            <a:lstStyle/>
+            <a:p>
+              <a:pPr algn="ctr"/>
+              <a:endParaRPr lang="en-US"/>
+            </a:p>
+          </p:txBody>
+        </p:sp>
+      </p:grpSp>
+    </p:spTree>
+    <p:extLst>
+      <p:ext uri="{BB962C8B-B14F-4D97-AF65-F5344CB8AC3E}">
+        <p14:creationId xmlns:p14="http://schemas.microsoft.com/office/powerpoint/2010/main" val="1870476661"/>
+      </p:ext>
+    </p:extLst>
+  </p:cSld>
+  <p:clrMapOvr>
+    <a:masterClrMapping/>
+  </p:clrMapOvr>
+</p:sld>
+</file>
+
+<file path=ppt/slides/slide4.xml><?xml version="1.0" encoding="utf-8"?>
+<p:sld xmlns:a="http://schemas.openxmlformats.org/drawingml/2006/main" xmlns:r="http://schemas.openxmlformats.org/officeDocument/2006/relationships" xmlns:p="http://schemas.openxmlformats.org/presentationml/2006/main">
+  <p:cSld>
+    <p:spTree>
+      <p:nvGrpSpPr>
+        <p:cNvPr id="1" name=""/>
+        <p:cNvGrpSpPr/>
+        <p:nvPr/>
+      </p:nvGrpSpPr>
+      <p:grpSpPr>
+        <a:xfrm>
+          <a:off x="0" y="0"/>
+          <a:ext cx="0" cy="0"/>
+          <a:chOff x="0" y="0"/>
+          <a:chExt cx="0" cy="0"/>
+        </a:xfrm>
+      </p:grpSpPr>
+      <p:grpSp>
+        <p:nvGrpSpPr>
+          <p:cNvPr id="24" name="Group 23">
+            <a:extLst>
+              <a:ext uri="{FF2B5EF4-FFF2-40B4-BE49-F238E27FC236}">
+                <a16:creationId xmlns:a16="http://schemas.microsoft.com/office/drawing/2014/main" id="{21EECA52-E0BD-4358-8AB8-49A6EF61B1A5}"/>
+              </a:ext>
+            </a:extLst>
+          </p:cNvPr>
+          <p:cNvGrpSpPr/>
+          <p:nvPr/>
+        </p:nvGrpSpPr>
+        <p:grpSpPr>
+          <a:xfrm>
+            <a:off x="-454841" y="-130311"/>
+            <a:ext cx="3770263" cy="3770263"/>
+            <a:chOff x="-454841" y="-130311"/>
+            <a:chExt cx="3770263" cy="3770263"/>
+          </a:xfrm>
+        </p:grpSpPr>
+        <p:sp>
+          <p:nvSpPr>
+            <p:cNvPr id="4" name="Rectangle: Rounded Corners 3">
+              <a:extLst>
+                <a:ext uri="{FF2B5EF4-FFF2-40B4-BE49-F238E27FC236}">
+                  <a16:creationId xmlns:a16="http://schemas.microsoft.com/office/drawing/2014/main" id="{F095E4BF-1057-43AB-84C4-0F3C8E38F912}"/>
+                </a:ext>
+              </a:extLst>
+            </p:cNvPr>
+            <p:cNvSpPr/>
+            <p:nvPr/>
+          </p:nvSpPr>
+          <p:spPr>
+            <a:xfrm>
+              <a:off x="565600" y="1506280"/>
+              <a:ext cx="1677926" cy="1677926"/>
+            </a:xfrm>
+            <a:prstGeom prst="roundRect">
+              <a:avLst>
+                <a:gd name="adj" fmla="val 3257"/>
+              </a:avLst>
+            </a:prstGeom>
+            <a:solidFill>
+              <a:srgbClr val="0099CC"/>
+            </a:solidFill>
+            <a:ln w="38100">
+              <a:solidFill>
+                <a:srgbClr val="336699"/>
+              </a:solidFill>
+            </a:ln>
+          </p:spPr>
+          <p:style>
+            <a:lnRef idx="2">
+              <a:schemeClr val="accent2"/>
+            </a:lnRef>
+            <a:fillRef idx="1">
+              <a:schemeClr val="lt1"/>
+            </a:fillRef>
+            <a:effectRef idx="0">
+              <a:schemeClr val="accent2"/>
+            </a:effectRef>
+            <a:fontRef idx="minor">
+              <a:schemeClr val="dk1"/>
+            </a:fontRef>
+          </p:style>
+          <p:txBody>
+            <a:bodyPr rtlCol="0" anchor="ctr"/>
+            <a:lstStyle/>
+            <a:p>
+              <a:pPr algn="ctr"/>
+              <a:endParaRPr lang="en-US"/>
+            </a:p>
+          </p:txBody>
+        </p:sp>
+        <p:sp>
+          <p:nvSpPr>
+            <p:cNvPr id="5" name="TextBox 4">
+              <a:extLst>
+                <a:ext uri="{FF2B5EF4-FFF2-40B4-BE49-F238E27FC236}">
+                  <a16:creationId xmlns:a16="http://schemas.microsoft.com/office/drawing/2014/main" id="{24DF639D-B82A-4CEB-898F-F964F5ECE490}"/>
+                </a:ext>
+              </a:extLst>
+            </p:cNvPr>
+            <p:cNvSpPr txBox="1"/>
+            <p:nvPr/>
+          </p:nvSpPr>
+          <p:spPr>
+            <a:xfrm>
+              <a:off x="459559" y="-130311"/>
+              <a:ext cx="1811708" cy="3770263"/>
+            </a:xfrm>
+            <a:prstGeom prst="rect">
+              <a:avLst/>
+            </a:prstGeom>
+            <a:noFill/>
+          </p:spPr>
+          <p:txBody>
+            <a:bodyPr wrap="square" rtlCol="0">
+              <a:spAutoFit/>
+            </a:bodyPr>
+            <a:lstStyle/>
+            <a:p>
+              <a:r>
+                <a:rPr lang="en-US" sz="23900" dirty="0">
+                  <a:solidFill>
+                    <a:schemeClr val="accent2"/>
+                  </a:solidFill>
+                  <a:latin typeface="Juice ITC" panose="04040403040A02020202" pitchFamily="82" charset="0"/>
+                </a:rPr>
+                <a:t>~</a:t>
+              </a:r>
+            </a:p>
+          </p:txBody>
+        </p:sp>
+        <p:sp>
+          <p:nvSpPr>
+            <p:cNvPr id="6" name="TextBox 5">
+              <a:extLst>
+                <a:ext uri="{FF2B5EF4-FFF2-40B4-BE49-F238E27FC236}">
+                  <a16:creationId xmlns:a16="http://schemas.microsoft.com/office/drawing/2014/main" id="{8750797A-A9CB-4EC1-9E14-5EE67BFF5CAA}"/>
+                </a:ext>
+              </a:extLst>
+            </p:cNvPr>
+            <p:cNvSpPr txBox="1"/>
+            <p:nvPr/>
+          </p:nvSpPr>
+          <p:spPr>
+            <a:xfrm rot="5400000">
+              <a:off x="524437" y="500654"/>
+              <a:ext cx="1811708" cy="3770263"/>
+            </a:xfrm>
+            <a:prstGeom prst="rect">
+              <a:avLst/>
+            </a:prstGeom>
+            <a:noFill/>
+          </p:spPr>
+          <p:txBody>
+            <a:bodyPr wrap="square" rtlCol="0">
+              <a:spAutoFit/>
+            </a:bodyPr>
+            <a:lstStyle/>
+            <a:p>
+              <a:r>
+                <a:rPr lang="en-US" sz="23900" dirty="0">
+                  <a:solidFill>
+                    <a:schemeClr val="accent2"/>
+                  </a:solidFill>
+                  <a:latin typeface="Juice ITC" panose="04040403040A02020202" pitchFamily="82" charset="0"/>
+                </a:rPr>
+                <a:t>~</a:t>
+              </a:r>
+            </a:p>
+          </p:txBody>
+        </p:sp>
+        <p:grpSp>
+          <p:nvGrpSpPr>
+            <p:cNvPr id="7" name="Group 6">
+              <a:extLst>
+                <a:ext uri="{FF2B5EF4-FFF2-40B4-BE49-F238E27FC236}">
+                  <a16:creationId xmlns:a16="http://schemas.microsoft.com/office/drawing/2014/main" id="{9886BADC-EBF0-4419-9D02-D3ECDB5377C4}"/>
+                </a:ext>
+              </a:extLst>
+            </p:cNvPr>
+            <p:cNvGrpSpPr/>
+            <p:nvPr/>
+          </p:nvGrpSpPr>
+          <p:grpSpPr>
+            <a:xfrm>
+              <a:off x="558776" y="1328248"/>
+              <a:ext cx="1285718" cy="1264018"/>
+              <a:chOff x="3627476" y="152341"/>
+              <a:chExt cx="1285718" cy="1264018"/>
+            </a:xfrm>
+          </p:grpSpPr>
+          <p:sp>
+            <p:nvSpPr>
+              <p:cNvPr id="8" name="TextBox 7">
+                <a:extLst>
+                  <a:ext uri="{FF2B5EF4-FFF2-40B4-BE49-F238E27FC236}">
+                    <a16:creationId xmlns:a16="http://schemas.microsoft.com/office/drawing/2014/main" id="{D73FB2DA-2BD3-48F5-B499-83FDB0D5A901}"/>
+                  </a:ext>
+                </a:extLst>
+              </p:cNvPr>
+              <p:cNvSpPr txBox="1"/>
+              <p:nvPr/>
+            </p:nvSpPr>
+            <p:spPr>
+              <a:xfrm>
+                <a:off x="3820634" y="152341"/>
+                <a:ext cx="1092560" cy="1200329"/>
+              </a:xfrm>
+              <a:prstGeom prst="rect">
+                <a:avLst/>
+              </a:prstGeom>
+              <a:noFill/>
+            </p:spPr>
+            <p:txBody>
+              <a:bodyPr wrap="square" rtlCol="0">
+                <a:spAutoFit/>
+              </a:bodyPr>
+              <a:lstStyle/>
+              <a:p>
+                <a:r>
+                  <a:rPr lang="en-US" sz="7200" b="1" dirty="0">
+                    <a:solidFill>
+                      <a:schemeClr val="accent2"/>
+                    </a:solidFill>
+                    <a:latin typeface="Juice ITC" panose="04040403040A02020202" pitchFamily="82" charset="0"/>
+                  </a:rPr>
+                  <a:t>~</a:t>
+                </a:r>
+              </a:p>
+            </p:txBody>
+          </p:sp>
+          <p:sp>
+            <p:nvSpPr>
+              <p:cNvPr id="9" name="TextBox 8">
+                <a:extLst>
+                  <a:ext uri="{FF2B5EF4-FFF2-40B4-BE49-F238E27FC236}">
+                    <a16:creationId xmlns:a16="http://schemas.microsoft.com/office/drawing/2014/main" id="{B2DC9DBD-08D9-41D7-8E2E-7EADE0640076}"/>
+                  </a:ext>
+                </a:extLst>
+              </p:cNvPr>
+              <p:cNvSpPr txBox="1"/>
+              <p:nvPr/>
+            </p:nvSpPr>
+            <p:spPr>
+              <a:xfrm>
+                <a:off x="3627476" y="216030"/>
+                <a:ext cx="750572" cy="1200329"/>
+              </a:xfrm>
+              <a:prstGeom prst="rect">
+                <a:avLst/>
+              </a:prstGeom>
+              <a:noFill/>
+            </p:spPr>
+            <p:txBody>
+              <a:bodyPr wrap="square" rtlCol="0">
+                <a:spAutoFit/>
+              </a:bodyPr>
+              <a:lstStyle/>
+              <a:p>
+                <a:r>
+                  <a:rPr lang="en-US" sz="7200" b="1" dirty="0">
+                    <a:solidFill>
+                      <a:schemeClr val="accent2"/>
+                    </a:solidFill>
+                    <a:latin typeface="Juice ITC" panose="04040403040A02020202" pitchFamily="82" charset="0"/>
+                  </a:rPr>
+                  <a:t>~</a:t>
+                </a:r>
+              </a:p>
+            </p:txBody>
+          </p:sp>
+          <p:sp>
+            <p:nvSpPr>
+              <p:cNvPr id="10" name="Rectangle: Rounded Corners 9">
+                <a:extLst>
+                  <a:ext uri="{FF2B5EF4-FFF2-40B4-BE49-F238E27FC236}">
+                    <a16:creationId xmlns:a16="http://schemas.microsoft.com/office/drawing/2014/main" id="{0368C19D-4A83-487D-BCBC-7343BBE2CCB8}"/>
+                  </a:ext>
+                </a:extLst>
+              </p:cNvPr>
+              <p:cNvSpPr/>
+              <p:nvPr/>
+            </p:nvSpPr>
+            <p:spPr>
+              <a:xfrm>
+                <a:off x="3691719" y="708342"/>
+                <a:ext cx="265395" cy="175318"/>
+              </a:xfrm>
+              <a:prstGeom prst="roundRect">
+                <a:avLst>
+                  <a:gd name="adj" fmla="val 0"/>
+                </a:avLst>
+              </a:prstGeom>
+              <a:solidFill>
+                <a:srgbClr val="0099CC"/>
+              </a:solidFill>
+              <a:ln w="38100">
+                <a:noFill/>
+              </a:ln>
+            </p:spPr>
+            <p:style>
+              <a:lnRef idx="2">
+                <a:schemeClr val="accent2"/>
+              </a:lnRef>
+              <a:fillRef idx="1">
+                <a:schemeClr val="lt1"/>
+              </a:fillRef>
+              <a:effectRef idx="0">
+                <a:schemeClr val="accent2"/>
+              </a:effectRef>
+              <a:fontRef idx="minor">
+                <a:schemeClr val="dk1"/>
+              </a:fontRef>
+            </p:style>
+            <p:txBody>
+              <a:bodyPr rtlCol="0" anchor="ctr"/>
+              <a:lstStyle/>
+              <a:p>
+                <a:pPr algn="ctr"/>
+                <a:endParaRPr lang="en-US" sz="1400"/>
+              </a:p>
+            </p:txBody>
+          </p:sp>
+        </p:grpSp>
+      </p:grpSp>
+      <p:sp>
+        <p:nvSpPr>
+          <p:cNvPr id="15" name="TextBox 14">
+            <a:extLst>
+              <a:ext uri="{FF2B5EF4-FFF2-40B4-BE49-F238E27FC236}">
+                <a16:creationId xmlns:a16="http://schemas.microsoft.com/office/drawing/2014/main" id="{5C820620-30F2-4DC2-8550-0F2B758DACEC}"/>
               </a:ext>
             </a:extLst>
           </p:cNvPr>
@@ -4491,8 +5488,8 @@
         </p:nvSpPr>
         <p:spPr>
           <a:xfrm>
-            <a:off x="904413" y="2919982"/>
-            <a:ext cx="1580882" cy="1200329"/>
+            <a:off x="2512210" y="1224723"/>
+            <a:ext cx="3478837" cy="2646878"/>
           </a:xfrm>
           <a:prstGeom prst="rect">
             <a:avLst/>
@@ -4506,19 +5503,19 @@
           <a:lstStyle/>
           <a:p>
             <a:r>
-              <a:rPr lang="en-US" sz="7200" dirty="0">
+              <a:rPr lang="en-US" sz="16600" dirty="0">
                 <a:latin typeface="Grenadier NF" panose="02010503020304020304" pitchFamily="2" charset="0"/>
               </a:rPr>
               <a:t>T</a:t>
             </a:r>
             <a:r>
-              <a:rPr lang="en-US" sz="2800" dirty="0">
+              <a:rPr lang="en-US" sz="8800" dirty="0">
                 <a:latin typeface="Grenadier NF" panose="02010503020304020304" pitchFamily="2" charset="0"/>
               </a:rPr>
               <a:t> </a:t>
             </a:r>
             <a:r>
-              <a:rPr lang="en-US" sz="7200" dirty="0">
+              <a:rPr lang="en-US" sz="16600" dirty="0">
                 <a:latin typeface="Grenadier NF" panose="02010503020304020304" pitchFamily="2" charset="0"/>
               </a:rPr>
               <a:t>lda</a:t>
@@ -4528,10 +5525,10 @@
       </p:sp>
       <p:sp>
         <p:nvSpPr>
-          <p:cNvPr id="16" name="Rectangle: Rounded Corners 15">
-            <a:extLst>
-              <a:ext uri="{FF2B5EF4-FFF2-40B4-BE49-F238E27FC236}">
-                <a16:creationId xmlns:a16="http://schemas.microsoft.com/office/drawing/2014/main" id="{FC8554FE-8227-428B-BFD9-A826B9D59EDE}"/>
+          <p:cNvPr id="19" name="Rectangle: Rounded Corners 18">
+            <a:extLst>
+              <a:ext uri="{FF2B5EF4-FFF2-40B4-BE49-F238E27FC236}">
+                <a16:creationId xmlns:a16="http://schemas.microsoft.com/office/drawing/2014/main" id="{D90E91B2-A46A-486F-B90E-702030DE3D03}"/>
               </a:ext>
             </a:extLst>
           </p:cNvPr>
@@ -4540,8 +5537,8 @@
         </p:nvSpPr>
         <p:spPr>
           <a:xfrm>
-            <a:off x="867837" y="3113402"/>
-            <a:ext cx="254450" cy="73152"/>
+            <a:off x="5727546" y="2644236"/>
+            <a:ext cx="562721" cy="159251"/>
           </a:xfrm>
           <a:prstGeom prst="roundRect">
             <a:avLst>
@@ -4576,16 +5573,53 @@
           <a:lstStyle/>
           <a:p>
             <a:pPr algn="ctr"/>
-            <a:endParaRPr lang="en-US"/>
-          </a:p>
-        </p:txBody>
-      </p:sp>
-      <p:sp>
-        <p:nvSpPr>
-          <p:cNvPr id="17" name="Rectangle: Rounded Corners 16">
-            <a:extLst>
-              <a:ext uri="{FF2B5EF4-FFF2-40B4-BE49-F238E27FC236}">
-                <a16:creationId xmlns:a16="http://schemas.microsoft.com/office/drawing/2014/main" id="{AA6F955F-B4EA-412F-AB5C-D9941166497F}"/>
+            <a:endParaRPr lang="en-US" sz="3600"/>
+          </a:p>
+        </p:txBody>
+      </p:sp>
+      <p:sp>
+        <p:nvSpPr>
+          <p:cNvPr id="21" name="TextBox 20">
+            <a:extLst>
+              <a:ext uri="{FF2B5EF4-FFF2-40B4-BE49-F238E27FC236}">
+                <a16:creationId xmlns:a16="http://schemas.microsoft.com/office/drawing/2014/main" id="{71BE4266-5008-441D-B2CD-0DFF5D57B928}"/>
+              </a:ext>
+            </a:extLst>
+          </p:cNvPr>
+          <p:cNvSpPr txBox="1"/>
+          <p:nvPr/>
+        </p:nvSpPr>
+        <p:spPr>
+          <a:xfrm>
+            <a:off x="3204468" y="1224722"/>
+            <a:ext cx="445956" cy="2646878"/>
+          </a:xfrm>
+          <a:prstGeom prst="rect">
+            <a:avLst/>
+          </a:prstGeom>
+          <a:noFill/>
+        </p:spPr>
+        <p:txBody>
+          <a:bodyPr wrap="none" rtlCol="0">
+            <a:spAutoFit/>
+          </a:bodyPr>
+          <a:lstStyle/>
+          <a:p>
+            <a:r>
+              <a:rPr lang="en-US" sz="16600" dirty="0">
+                <a:latin typeface="Grenadier NF" panose="02010503020304020304" pitchFamily="2" charset="0"/>
+              </a:rPr>
+              <a:t>i</a:t>
+            </a:r>
+          </a:p>
+        </p:txBody>
+      </p:sp>
+      <p:sp>
+        <p:nvSpPr>
+          <p:cNvPr id="27" name="Rectangle: Rounded Corners 26">
+            <a:extLst>
+              <a:ext uri="{FF2B5EF4-FFF2-40B4-BE49-F238E27FC236}">
+                <a16:creationId xmlns:a16="http://schemas.microsoft.com/office/drawing/2014/main" id="{674B5E25-D1F8-4ACA-94B7-9A254A7A7FE8}"/>
               </a:ext>
             </a:extLst>
           </p:cNvPr>
@@ -4594,8 +5628,62 @@
         </p:nvSpPr>
         <p:spPr>
           <a:xfrm>
-            <a:off x="846637" y="3105454"/>
-            <a:ext cx="73152" cy="85924"/>
+            <a:off x="2357607" y="1612761"/>
+            <a:ext cx="447166" cy="161946"/>
+          </a:xfrm>
+          <a:prstGeom prst="roundRect">
+            <a:avLst>
+              <a:gd name="adj" fmla="val 0"/>
+            </a:avLst>
+          </a:prstGeom>
+          <a:solidFill>
+            <a:schemeClr val="tx1"/>
+          </a:solidFill>
+          <a:ln>
+            <a:noFill/>
+          </a:ln>
+        </p:spPr>
+        <p:style>
+          <a:lnRef idx="2">
+            <a:schemeClr val="accent1">
+              <a:shade val="50000"/>
+            </a:schemeClr>
+          </a:lnRef>
+          <a:fillRef idx="1">
+            <a:schemeClr val="accent1"/>
+          </a:fillRef>
+          <a:effectRef idx="0">
+            <a:schemeClr val="accent1"/>
+          </a:effectRef>
+          <a:fontRef idx="minor">
+            <a:schemeClr val="lt1"/>
+          </a:fontRef>
+        </p:style>
+        <p:txBody>
+          <a:bodyPr rtlCol="0" anchor="ctr"/>
+          <a:lstStyle/>
+          <a:p>
+            <a:pPr algn="ctr"/>
+            <a:endParaRPr lang="en-US" sz="3600"/>
+          </a:p>
+        </p:txBody>
+      </p:sp>
+      <p:sp>
+        <p:nvSpPr>
+          <p:cNvPr id="20" name="Rectangle: Rounded Corners 19">
+            <a:extLst>
+              <a:ext uri="{FF2B5EF4-FFF2-40B4-BE49-F238E27FC236}">
+                <a16:creationId xmlns:a16="http://schemas.microsoft.com/office/drawing/2014/main" id="{2E8D1FE9-1253-4846-9CAA-DAB9EEA35746}"/>
+              </a:ext>
+            </a:extLst>
+          </p:cNvPr>
+          <p:cNvSpPr/>
+          <p:nvPr/>
+        </p:nvSpPr>
+        <p:spPr>
+          <a:xfrm>
+            <a:off x="3339990" y="1969480"/>
+            <a:ext cx="171909" cy="222784"/>
           </a:xfrm>
           <a:prstGeom prst="roundRect">
             <a:avLst>
@@ -4635,16 +5723,16 @@
           <a:lstStyle/>
           <a:p>
             <a:pPr algn="ctr"/>
-            <a:endParaRPr lang="en-US"/>
-          </a:p>
-        </p:txBody>
-      </p:sp>
-      <p:sp>
-        <p:nvSpPr>
-          <p:cNvPr id="18" name="Rectangle: Rounded Corners 17">
-            <a:extLst>
-              <a:ext uri="{FF2B5EF4-FFF2-40B4-BE49-F238E27FC236}">
-                <a16:creationId xmlns:a16="http://schemas.microsoft.com/office/drawing/2014/main" id="{0776F393-8375-47D8-A4E4-2A92259F9DC1}"/>
+            <a:endParaRPr lang="en-US" sz="3600"/>
+          </a:p>
+        </p:txBody>
+      </p:sp>
+      <p:sp>
+        <p:nvSpPr>
+          <p:cNvPr id="32" name="Rectangle: Rounded Corners 31">
+            <a:extLst>
+              <a:ext uri="{FF2B5EF4-FFF2-40B4-BE49-F238E27FC236}">
+                <a16:creationId xmlns:a16="http://schemas.microsoft.com/office/drawing/2014/main" id="{E257F893-DC41-4D68-88AF-C5A73E6CD176}"/>
               </a:ext>
             </a:extLst>
           </p:cNvPr>
@@ -4652,9 +5740,9 @@
           <p:nvPr/>
         </p:nvSpPr>
         <p:spPr>
-          <a:xfrm>
-            <a:off x="1402076" y="3160005"/>
-            <a:ext cx="73152" cy="85924"/>
+          <a:xfrm rot="16200000">
+            <a:off x="2273407" y="1619055"/>
+            <a:ext cx="174594" cy="149837"/>
           </a:xfrm>
           <a:prstGeom prst="roundRect">
             <a:avLst>
@@ -4694,16 +5782,16 @@
           <a:lstStyle/>
           <a:p>
             <a:pPr algn="ctr"/>
-            <a:endParaRPr lang="en-US"/>
-          </a:p>
-        </p:txBody>
-      </p:sp>
-      <p:sp>
-        <p:nvSpPr>
-          <p:cNvPr id="19" name="Rectangle: Rounded Corners 18">
-            <a:extLst>
-              <a:ext uri="{FF2B5EF4-FFF2-40B4-BE49-F238E27FC236}">
-                <a16:creationId xmlns:a16="http://schemas.microsoft.com/office/drawing/2014/main" id="{26F335A1-F94C-4DC2-B2D4-DA86A1350186}"/>
+            <a:endParaRPr lang="en-US" sz="3600"/>
+          </a:p>
+        </p:txBody>
+      </p:sp>
+      <p:sp>
+        <p:nvSpPr>
+          <p:cNvPr id="33" name="Rectangle: Rounded Corners 32">
+            <a:extLst>
+              <a:ext uri="{FF2B5EF4-FFF2-40B4-BE49-F238E27FC236}">
+                <a16:creationId xmlns:a16="http://schemas.microsoft.com/office/drawing/2014/main" id="{9FDAB2C4-41AB-4C9A-9236-2EC1D28B424D}"/>
               </a:ext>
             </a:extLst>
           </p:cNvPr>
@@ -4711,63 +5799,9 @@
           <p:nvPr/>
         </p:nvSpPr>
         <p:spPr>
-          <a:xfrm>
-            <a:off x="2269228" y="3557350"/>
-            <a:ext cx="254450" cy="73152"/>
-          </a:xfrm>
-          <a:prstGeom prst="roundRect">
-            <a:avLst>
-              <a:gd name="adj" fmla="val 0"/>
-            </a:avLst>
-          </a:prstGeom>
-          <a:solidFill>
-            <a:schemeClr val="tx1"/>
-          </a:solidFill>
-          <a:ln>
-            <a:noFill/>
-          </a:ln>
-        </p:spPr>
-        <p:style>
-          <a:lnRef idx="2">
-            <a:schemeClr val="accent1">
-              <a:shade val="50000"/>
-            </a:schemeClr>
-          </a:lnRef>
-          <a:fillRef idx="1">
-            <a:schemeClr val="accent1"/>
-          </a:fillRef>
-          <a:effectRef idx="0">
-            <a:schemeClr val="accent1"/>
-          </a:effectRef>
-          <a:fontRef idx="minor">
-            <a:schemeClr val="lt1"/>
-          </a:fontRef>
-        </p:style>
-        <p:txBody>
-          <a:bodyPr rtlCol="0" anchor="ctr"/>
-          <a:lstStyle/>
-          <a:p>
-            <a:pPr algn="ctr"/>
-            <a:endParaRPr lang="en-US"/>
-          </a:p>
-        </p:txBody>
-      </p:sp>
-      <p:sp>
-        <p:nvSpPr>
-          <p:cNvPr id="20" name="Rectangle: Rounded Corners 19">
-            <a:extLst>
-              <a:ext uri="{FF2B5EF4-FFF2-40B4-BE49-F238E27FC236}">
-                <a16:creationId xmlns:a16="http://schemas.microsoft.com/office/drawing/2014/main" id="{E2DF8888-15EF-435F-9A9A-3639B7036D34}"/>
-              </a:ext>
-            </a:extLst>
-          </p:cNvPr>
-          <p:cNvSpPr/>
-          <p:nvPr/>
-        </p:nvSpPr>
-        <p:spPr>
-          <a:xfrm>
-            <a:off x="2498545" y="3549878"/>
-            <a:ext cx="73152" cy="85924"/>
+          <a:xfrm rot="16200000">
+            <a:off x="6164788" y="2643919"/>
+            <a:ext cx="174594" cy="149837"/>
           </a:xfrm>
           <a:prstGeom prst="roundRect">
             <a:avLst>
@@ -4807,63 +5841,26 @@
           <a:lstStyle/>
           <a:p>
             <a:pPr algn="ctr"/>
-            <a:endParaRPr lang="en-US"/>
-          </a:p>
-        </p:txBody>
-      </p:sp>
-      <p:sp>
-        <p:nvSpPr>
-          <p:cNvPr id="4" name="TextBox 3">
-            <a:extLst>
-              <a:ext uri="{FF2B5EF4-FFF2-40B4-BE49-F238E27FC236}">
-                <a16:creationId xmlns:a16="http://schemas.microsoft.com/office/drawing/2014/main" id="{96470405-DDB0-4C6D-BE1C-76AA691C106B}"/>
-              </a:ext>
-            </a:extLst>
-          </p:cNvPr>
-          <p:cNvSpPr txBox="1"/>
+            <a:endParaRPr lang="en-US" sz="3600"/>
+          </a:p>
+        </p:txBody>
+      </p:sp>
+      <p:sp>
+        <p:nvSpPr>
+          <p:cNvPr id="34" name="Rectangle: Rounded Corners 33">
+            <a:extLst>
+              <a:ext uri="{FF2B5EF4-FFF2-40B4-BE49-F238E27FC236}">
+                <a16:creationId xmlns:a16="http://schemas.microsoft.com/office/drawing/2014/main" id="{1953B286-FB67-49A1-8A74-11868644ED61}"/>
+              </a:ext>
+            </a:extLst>
+          </p:cNvPr>
+          <p:cNvSpPr/>
           <p:nvPr/>
         </p:nvSpPr>
         <p:spPr>
           <a:xfrm>
-            <a:off x="1171496" y="2919981"/>
-            <a:ext cx="298480" cy="1200329"/>
-          </a:xfrm>
-          <a:prstGeom prst="rect">
-            <a:avLst/>
-          </a:prstGeom>
-          <a:noFill/>
-        </p:spPr>
-        <p:txBody>
-          <a:bodyPr wrap="none" rtlCol="0">
-            <a:spAutoFit/>
-          </a:bodyPr>
-          <a:lstStyle/>
-          <a:p>
-            <a:r>
-              <a:rPr lang="en-US" sz="7200" dirty="0">
-                <a:latin typeface="Grenadier NF" panose="02010503020304020304" pitchFamily="2" charset="0"/>
-              </a:rPr>
-              <a:t>i</a:t>
-            </a:r>
-          </a:p>
-        </p:txBody>
-      </p:sp>
-      <p:sp>
-        <p:nvSpPr>
-          <p:cNvPr id="9" name="Rectangle: Rounded Corners 8">
-            <a:extLst>
-              <a:ext uri="{FF2B5EF4-FFF2-40B4-BE49-F238E27FC236}">
-                <a16:creationId xmlns:a16="http://schemas.microsoft.com/office/drawing/2014/main" id="{0D3336B6-2542-43AF-B187-72D927F101B3}"/>
-              </a:ext>
-            </a:extLst>
-          </p:cNvPr>
-          <p:cNvSpPr/>
-          <p:nvPr/>
-        </p:nvSpPr>
-        <p:spPr>
-          <a:xfrm>
-            <a:off x="1282365" y="3294670"/>
-            <a:ext cx="73152" cy="53865"/>
+            <a:off x="3339990" y="2059567"/>
+            <a:ext cx="161767" cy="132697"/>
           </a:xfrm>
           <a:prstGeom prst="roundRect">
             <a:avLst>
@@ -4894,60 +5891,6 @@
           </a:fontRef>
         </p:style>
         <p:txBody>
-          <a:bodyPr rtlCol="0" anchor="ctr"/>
-          <a:lstStyle/>
-          <a:p>
-            <a:pPr algn="ctr"/>
-            <a:endParaRPr lang="en-US"/>
-          </a:p>
-        </p:txBody>
-      </p:sp>
-      <p:sp>
-        <p:nvSpPr>
-          <p:cNvPr id="11" name="Rectangle: Rounded Corners 10">
-            <a:extLst>
-              <a:ext uri="{FF2B5EF4-FFF2-40B4-BE49-F238E27FC236}">
-                <a16:creationId xmlns:a16="http://schemas.microsoft.com/office/drawing/2014/main" id="{562598C8-2A87-4865-B185-B0F50231EA3E}"/>
-              </a:ext>
-            </a:extLst>
-          </p:cNvPr>
-          <p:cNvSpPr/>
-          <p:nvPr/>
-        </p:nvSpPr>
-        <p:spPr>
-          <a:xfrm>
-            <a:off x="1282365" y="3272429"/>
-            <a:ext cx="73152" cy="53865"/>
-          </a:xfrm>
-          <a:prstGeom prst="roundRect">
-            <a:avLst>
-              <a:gd name="adj" fmla="val 50000"/>
-            </a:avLst>
-          </a:prstGeom>
-          <a:solidFill>
-            <a:schemeClr val="bg1"/>
-          </a:solidFill>
-          <a:ln>
-            <a:noFill/>
-          </a:ln>
-        </p:spPr>
-        <p:style>
-          <a:lnRef idx="2">
-            <a:schemeClr val="accent1">
-              <a:shade val="50000"/>
-            </a:schemeClr>
-          </a:lnRef>
-          <a:fillRef idx="1">
-            <a:schemeClr val="accent1"/>
-          </a:fillRef>
-          <a:effectRef idx="0">
-            <a:schemeClr val="accent1"/>
-          </a:effectRef>
-          <a:fontRef idx="minor">
-            <a:schemeClr val="lt1"/>
-          </a:fontRef>
-        </p:style>
-        <p:txBody>
           <a:bodyPr rot="0" spcFirstLastPara="0" vertOverflow="overflow" horzOverflow="overflow" vert="horz" wrap="square" lIns="91440" tIns="45720" rIns="91440" bIns="45720" numCol="1" spcCol="0" rtlCol="0" fromWordArt="0" anchor="ctr" anchorCtr="0" forceAA="0" compatLnSpc="1">
             <a:prstTxWarp prst="textNoShape">
               <a:avLst/>
@@ -4957,14 +5900,14 @@
           <a:lstStyle/>
           <a:p>
             <a:pPr algn="ctr"/>
-            <a:endParaRPr lang="en-US"/>
+            <a:endParaRPr lang="en-US" sz="3600"/>
           </a:p>
         </p:txBody>
       </p:sp>
     </p:spTree>
     <p:extLst>
       <p:ext uri="{BB962C8B-B14F-4D97-AF65-F5344CB8AC3E}">
-        <p14:creationId xmlns:p14="http://schemas.microsoft.com/office/powerpoint/2010/main" val="1870476661"/>
+        <p14:creationId xmlns:p14="http://schemas.microsoft.com/office/powerpoint/2010/main" val="2808045172"/>
       </p:ext>
     </p:extLst>
   </p:cSld>

</xml_diff>